<commit_message>
Complete User Flow User Flow diagram
</commit_message>
<xml_diff>
--- a/Documentation/Presentations/Presentation3.pptx
+++ b/Documentation/Presentations/Presentation3.pptx
@@ -7,6 +7,12 @@
   <p:sldIdLst>
     <p:sldId id="256" r:id="rId2"/>
     <p:sldId id="257" r:id="rId3"/>
+    <p:sldId id="258" r:id="rId4"/>
+    <p:sldId id="259" r:id="rId5"/>
+    <p:sldId id="260" r:id="rId6"/>
+    <p:sldId id="261" r:id="rId7"/>
+    <p:sldId id="262" r:id="rId8"/>
+    <p:sldId id="263" r:id="rId9"/>
   </p:sldIdLst>
   <p:sldSz cx="12192000" cy="6858000"/>
   <p:notesSz cx="6858000" cy="9144000"/>
@@ -3491,7 +3497,7 @@
               <a:buNone/>
             </a:pPr>
             <a:r>
-              <a:rPr lang="en-US">
+              <a:rPr lang="en-US" dirty="0">
                 <a:hlinkClick r:id="rId2"/>
               </a:rPr>
               <a:t>My Documentation</a:t>
@@ -3504,6 +3510,1118 @@
     <p:extLst>
       <p:ext uri="{BB962C8B-B14F-4D97-AF65-F5344CB8AC3E}">
         <p14:creationId xmlns:p14="http://schemas.microsoft.com/office/powerpoint/2010/main" val="1737693365"/>
+      </p:ext>
+    </p:extLst>
+  </p:cSld>
+  <p:clrMapOvr>
+    <a:masterClrMapping/>
+  </p:clrMapOvr>
+</p:sld>
+</file>
+
+<file path=ppt/slides/slide3.xml><?xml version="1.0" encoding="utf-8"?>
+<p:sld xmlns:a="http://schemas.openxmlformats.org/drawingml/2006/main" xmlns:r="http://schemas.openxmlformats.org/officeDocument/2006/relationships" xmlns:p="http://schemas.openxmlformats.org/presentationml/2006/main">
+  <p:cSld>
+    <p:spTree>
+      <p:nvGrpSpPr>
+        <p:cNvPr id="1" name=""/>
+        <p:cNvGrpSpPr/>
+        <p:nvPr/>
+      </p:nvGrpSpPr>
+      <p:grpSpPr>
+        <a:xfrm>
+          <a:off x="0" y="0"/>
+          <a:ext cx="0" cy="0"/>
+          <a:chOff x="0" y="0"/>
+          <a:chExt cx="0" cy="0"/>
+        </a:xfrm>
+      </p:grpSpPr>
+      <p:sp>
+        <p:nvSpPr>
+          <p:cNvPr id="2" name="Title 1">
+            <a:extLst>
+              <a:ext uri="{FF2B5EF4-FFF2-40B4-BE49-F238E27FC236}">
+                <a16:creationId xmlns:a16="http://schemas.microsoft.com/office/drawing/2014/main" id="{8957AED6-FA5C-D208-59B6-B8783A2CB32D}"/>
+              </a:ext>
+            </a:extLst>
+          </p:cNvPr>
+          <p:cNvSpPr>
+            <a:spLocks noGrp="1"/>
+          </p:cNvSpPr>
+          <p:nvPr>
+            <p:ph type="title"/>
+          </p:nvPr>
+        </p:nvSpPr>
+        <p:spPr/>
+        <p:txBody>
+          <a:bodyPr/>
+          <a:lstStyle/>
+          <a:p>
+            <a:r>
+              <a:rPr lang="en-US" dirty="0"/>
+              <a:t>Design Timeline</a:t>
+            </a:r>
+          </a:p>
+        </p:txBody>
+      </p:sp>
+      <p:sp>
+        <p:nvSpPr>
+          <p:cNvPr id="3" name="Content Placeholder 2">
+            <a:extLst>
+              <a:ext uri="{FF2B5EF4-FFF2-40B4-BE49-F238E27FC236}">
+                <a16:creationId xmlns:a16="http://schemas.microsoft.com/office/drawing/2014/main" id="{7D13B4C5-EA38-EF61-0274-5229C766C96E}"/>
+              </a:ext>
+            </a:extLst>
+          </p:cNvPr>
+          <p:cNvSpPr>
+            <a:spLocks noGrp="1"/>
+          </p:cNvSpPr>
+          <p:nvPr>
+            <p:ph idx="1"/>
+          </p:nvPr>
+        </p:nvSpPr>
+        <p:spPr/>
+        <p:txBody>
+          <a:bodyPr>
+            <a:noAutofit/>
+          </a:bodyPr>
+          <a:lstStyle/>
+          <a:p>
+            <a:pPr algn="l">
+              <a:buFont typeface="+mj-lt"/>
+              <a:buAutoNum type="arabicPeriod"/>
+            </a:pPr>
+            <a:r>
+              <a:rPr lang="en-US" sz="1800" b="0" i="0" u="none" strike="noStrike" dirty="0">
+                <a:effectLst/>
+              </a:rPr>
+              <a:t>Use Case diagram (1 day)</a:t>
+            </a:r>
+          </a:p>
+          <a:p>
+            <a:pPr algn="l">
+              <a:buFont typeface="+mj-lt"/>
+              <a:buAutoNum type="arabicPeriod"/>
+            </a:pPr>
+            <a:r>
+              <a:rPr lang="en-US" sz="1800" b="0" i="0" u="none" strike="noStrike" dirty="0">
+                <a:effectLst/>
+              </a:rPr>
+              <a:t>System Architecture diagram (1 day)</a:t>
+            </a:r>
+          </a:p>
+          <a:p>
+            <a:pPr algn="l">
+              <a:buFont typeface="+mj-lt"/>
+              <a:buAutoNum type="arabicPeriod"/>
+            </a:pPr>
+            <a:r>
+              <a:rPr lang="en-US" sz="1800" b="0" i="0" u="none" strike="noStrike" dirty="0">
+                <a:effectLst/>
+              </a:rPr>
+              <a:t>Data Flow, User Flow, System Sequence Diagrams (2 days)</a:t>
+            </a:r>
+          </a:p>
+          <a:p>
+            <a:pPr algn="l">
+              <a:buFont typeface="+mj-lt"/>
+              <a:buAutoNum type="arabicPeriod"/>
+            </a:pPr>
+            <a:r>
+              <a:rPr lang="en-US" sz="1800" b="0" i="0" u="none" strike="noStrike" dirty="0">
+                <a:effectLst/>
+              </a:rPr>
+              <a:t>Database diagram (2 days)</a:t>
+            </a:r>
+          </a:p>
+          <a:p>
+            <a:pPr algn="l">
+              <a:buFont typeface="+mj-lt"/>
+              <a:buAutoNum type="arabicPeriod"/>
+            </a:pPr>
+            <a:r>
+              <a:rPr lang="en-US" sz="1800" b="0" i="0" u="none" strike="noStrike" dirty="0">
+                <a:effectLst/>
+              </a:rPr>
+              <a:t>UI Design ( 2 weeks). Each includes computer, tablet, and mobile layouts. Excess time will be used for refinement.</a:t>
+            </a:r>
+          </a:p>
+          <a:p>
+            <a:pPr marL="742950" lvl="1" indent="-285750" algn="l">
+              <a:buFont typeface="+mj-lt"/>
+              <a:buAutoNum type="arabicPeriod"/>
+            </a:pPr>
+            <a:r>
+              <a:rPr lang="en-US" sz="1800" b="0" i="0" u="none" strike="noStrike" dirty="0">
+                <a:effectLst/>
+              </a:rPr>
+              <a:t>Homepage ( 1 day)</a:t>
+            </a:r>
+          </a:p>
+          <a:p>
+            <a:pPr marL="742950" lvl="1" indent="-285750" algn="l">
+              <a:buFont typeface="+mj-lt"/>
+              <a:buAutoNum type="arabicPeriod"/>
+            </a:pPr>
+            <a:r>
+              <a:rPr lang="en-US" sz="1800" b="0" i="0" u="none" strike="noStrike" dirty="0">
+                <a:effectLst/>
+              </a:rPr>
+              <a:t>Routine Creator (3 days)</a:t>
+            </a:r>
+          </a:p>
+          <a:p>
+            <a:pPr marL="742950" lvl="1" indent="-285750" algn="l">
+              <a:buFont typeface="+mj-lt"/>
+              <a:buAutoNum type="arabicPeriod"/>
+            </a:pPr>
+            <a:r>
+              <a:rPr lang="en-US" sz="1800" b="0" i="0" u="none" strike="noStrike" dirty="0">
+                <a:effectLst/>
+              </a:rPr>
+              <a:t>Routine Viewer ( 1 day)</a:t>
+            </a:r>
+          </a:p>
+          <a:p>
+            <a:pPr marL="742950" lvl="1" indent="-285750" algn="l">
+              <a:buFont typeface="+mj-lt"/>
+              <a:buAutoNum type="arabicPeriod"/>
+            </a:pPr>
+            <a:r>
+              <a:rPr lang="en-US" sz="1800" b="0" i="0" u="none" strike="noStrike" dirty="0">
+                <a:effectLst/>
+              </a:rPr>
+              <a:t>Routine Search ( 1 day)</a:t>
+            </a:r>
+          </a:p>
+          <a:p>
+            <a:pPr marL="742950" lvl="1" indent="-285750" algn="l">
+              <a:buFont typeface="+mj-lt"/>
+              <a:buAutoNum type="arabicPeriod"/>
+            </a:pPr>
+            <a:r>
+              <a:rPr lang="en-US" sz="1800" b="0" i="0" u="none" strike="noStrike" dirty="0">
+                <a:effectLst/>
+              </a:rPr>
+              <a:t>Workout Editor ( 2 days)</a:t>
+            </a:r>
+          </a:p>
+          <a:p>
+            <a:pPr marL="742950" lvl="1" indent="-285750" algn="l">
+              <a:buFont typeface="+mj-lt"/>
+              <a:buAutoNum type="arabicPeriod"/>
+            </a:pPr>
+            <a:r>
+              <a:rPr lang="en-US" sz="1800" b="0" i="0" u="none" strike="noStrike" dirty="0">
+                <a:effectLst/>
+              </a:rPr>
+              <a:t>Workout List ( 1 day)</a:t>
+            </a:r>
+          </a:p>
+          <a:p>
+            <a:pPr marL="742950" lvl="1" indent="-285750" algn="l">
+              <a:buFont typeface="+mj-lt"/>
+              <a:buAutoNum type="arabicPeriod"/>
+            </a:pPr>
+            <a:r>
+              <a:rPr lang="en-US" sz="1800" b="0" i="0" u="none" strike="noStrike" dirty="0">
+                <a:effectLst/>
+              </a:rPr>
+              <a:t>Login/Register ( 1 day)</a:t>
+            </a:r>
+          </a:p>
+          <a:p>
+            <a:pPr marL="742950" lvl="1" indent="-285750" algn="l">
+              <a:buFont typeface="+mj-lt"/>
+              <a:buAutoNum type="arabicPeriod"/>
+            </a:pPr>
+            <a:r>
+              <a:rPr lang="en-US" sz="1800" b="0" i="0" u="none" strike="noStrike" dirty="0">
+                <a:effectLst/>
+              </a:rPr>
+              <a:t>Profile( 1 day)</a:t>
+            </a:r>
+          </a:p>
+          <a:p>
+            <a:endParaRPr lang="en-US" sz="1800" dirty="0"/>
+          </a:p>
+        </p:txBody>
+      </p:sp>
+    </p:spTree>
+    <p:extLst>
+      <p:ext uri="{BB962C8B-B14F-4D97-AF65-F5344CB8AC3E}">
+        <p14:creationId xmlns:p14="http://schemas.microsoft.com/office/powerpoint/2010/main" val="181545781"/>
+      </p:ext>
+    </p:extLst>
+  </p:cSld>
+  <p:clrMapOvr>
+    <a:masterClrMapping/>
+  </p:clrMapOvr>
+</p:sld>
+</file>
+
+<file path=ppt/slides/slide4.xml><?xml version="1.0" encoding="utf-8"?>
+<p:sld xmlns:a="http://schemas.openxmlformats.org/drawingml/2006/main" xmlns:r="http://schemas.openxmlformats.org/officeDocument/2006/relationships" xmlns:p="http://schemas.openxmlformats.org/presentationml/2006/main">
+  <p:cSld>
+    <p:spTree>
+      <p:nvGrpSpPr>
+        <p:cNvPr id="1" name=""/>
+        <p:cNvGrpSpPr/>
+        <p:nvPr/>
+      </p:nvGrpSpPr>
+      <p:grpSpPr>
+        <a:xfrm>
+          <a:off x="0" y="0"/>
+          <a:ext cx="0" cy="0"/>
+          <a:chOff x="0" y="0"/>
+          <a:chExt cx="0" cy="0"/>
+        </a:xfrm>
+      </p:grpSpPr>
+      <p:sp>
+        <p:nvSpPr>
+          <p:cNvPr id="2" name="Title 1">
+            <a:extLst>
+              <a:ext uri="{FF2B5EF4-FFF2-40B4-BE49-F238E27FC236}">
+                <a16:creationId xmlns:a16="http://schemas.microsoft.com/office/drawing/2014/main" id="{EBACC91F-062D-CF0C-9791-8677B1AC4D2F}"/>
+              </a:ext>
+            </a:extLst>
+          </p:cNvPr>
+          <p:cNvSpPr>
+            <a:spLocks noGrp="1"/>
+          </p:cNvSpPr>
+          <p:nvPr>
+            <p:ph type="title"/>
+          </p:nvPr>
+        </p:nvSpPr>
+        <p:spPr/>
+        <p:txBody>
+          <a:bodyPr/>
+          <a:lstStyle/>
+          <a:p>
+            <a:r>
+              <a:rPr lang="en-US" dirty="0"/>
+              <a:t>Development Timeline</a:t>
+            </a:r>
+          </a:p>
+        </p:txBody>
+      </p:sp>
+      <p:sp>
+        <p:nvSpPr>
+          <p:cNvPr id="3" name="Content Placeholder 2">
+            <a:extLst>
+              <a:ext uri="{FF2B5EF4-FFF2-40B4-BE49-F238E27FC236}">
+                <a16:creationId xmlns:a16="http://schemas.microsoft.com/office/drawing/2014/main" id="{4367105D-6627-EE6C-A923-357747089108}"/>
+              </a:ext>
+            </a:extLst>
+          </p:cNvPr>
+          <p:cNvSpPr>
+            <a:spLocks noGrp="1"/>
+          </p:cNvSpPr>
+          <p:nvPr>
+            <p:ph idx="1"/>
+          </p:nvPr>
+        </p:nvSpPr>
+        <p:spPr/>
+        <p:txBody>
+          <a:bodyPr>
+            <a:noAutofit/>
+          </a:bodyPr>
+          <a:lstStyle/>
+          <a:p>
+            <a:pPr marL="0" indent="0" algn="l">
+              <a:buNone/>
+            </a:pPr>
+            <a:r>
+              <a:rPr lang="en-US" sz="1800" b="1" i="0" u="none" strike="noStrike" dirty="0">
+                <a:effectLst/>
+              </a:rPr>
+              <a:t>Test cases should be created before starting on each component.</a:t>
+            </a:r>
+            <a:endParaRPr lang="en-US" sz="1800" b="0" i="0" u="none" strike="noStrike" dirty="0">
+              <a:effectLst/>
+            </a:endParaRPr>
+          </a:p>
+          <a:p>
+            <a:pPr algn="l">
+              <a:buFont typeface="+mj-lt"/>
+              <a:buAutoNum type="arabicPeriod"/>
+            </a:pPr>
+            <a:r>
+              <a:rPr lang="en-US" sz="1800" b="0" i="0" u="none" strike="noStrike" dirty="0">
+                <a:effectLst/>
+              </a:rPr>
+              <a:t>Fit Test: Create ultra-barebones frontend and database, test CRUD of basic data. (1 day)</a:t>
+            </a:r>
+          </a:p>
+          <a:p>
+            <a:pPr algn="l">
+              <a:buFont typeface="+mj-lt"/>
+              <a:buAutoNum type="arabicPeriod"/>
+            </a:pPr>
+            <a:r>
+              <a:rPr lang="en-US" sz="1800" b="0" i="0" u="none" strike="noStrike" dirty="0">
+                <a:effectLst/>
+              </a:rPr>
+              <a:t>User Collection: Create the collection for user accounts.( 1/2 day)</a:t>
+            </a:r>
+          </a:p>
+          <a:p>
+            <a:pPr algn="l">
+              <a:buFont typeface="+mj-lt"/>
+              <a:buAutoNum type="arabicPeriod"/>
+            </a:pPr>
+            <a:r>
+              <a:rPr lang="en-US" sz="1800" b="0" i="0" u="none" strike="noStrike" dirty="0">
+                <a:effectLst/>
+              </a:rPr>
+              <a:t>User Functions; Create JS functions to handle user data CRUD (2 days)</a:t>
+            </a:r>
+          </a:p>
+          <a:p>
+            <a:pPr algn="l">
+              <a:buFont typeface="+mj-lt"/>
+              <a:buAutoNum type="arabicPeriod"/>
+            </a:pPr>
+            <a:r>
+              <a:rPr lang="en-US" sz="1800" b="0" i="0" u="none" strike="noStrike" dirty="0">
+                <a:effectLst/>
+              </a:rPr>
+              <a:t>User Authorization: Add firebase auth to frontend (1 day)</a:t>
+            </a:r>
+          </a:p>
+          <a:p>
+            <a:pPr algn="l">
+              <a:buFont typeface="+mj-lt"/>
+              <a:buAutoNum type="arabicPeriod"/>
+            </a:pPr>
+            <a:r>
+              <a:rPr lang="en-US" sz="1800" b="0" i="0" u="none" strike="noStrike" dirty="0">
+                <a:effectLst/>
+              </a:rPr>
+              <a:t>Login frontend: Create frontend page to login a user and send them to dummy homepage.(1 day)</a:t>
+            </a:r>
+          </a:p>
+          <a:p>
+            <a:pPr algn="l">
+              <a:buFont typeface="+mj-lt"/>
+              <a:buAutoNum type="arabicPeriod"/>
+            </a:pPr>
+            <a:r>
+              <a:rPr lang="en-US" sz="1800" b="0" i="0" u="none" strike="noStrike" dirty="0">
+                <a:effectLst/>
+              </a:rPr>
+              <a:t>Register frontend: Create registration page to create new users.(1 day)</a:t>
+            </a:r>
+          </a:p>
+          <a:p>
+            <a:pPr algn="l">
+              <a:buFont typeface="+mj-lt"/>
+              <a:buAutoNum type="arabicPeriod"/>
+            </a:pPr>
+            <a:r>
+              <a:rPr lang="en-US" sz="1800" b="0" i="0" u="none" strike="noStrike" dirty="0">
+                <a:effectLst/>
+              </a:rPr>
+              <a:t>Navbar: Create site navigation bar. (1 day)</a:t>
+            </a:r>
+          </a:p>
+          <a:p>
+            <a:pPr algn="l">
+              <a:buFont typeface="+mj-lt"/>
+              <a:buAutoNum type="arabicPeriod"/>
+            </a:pPr>
+            <a:r>
+              <a:rPr lang="en-US" sz="1800" b="0" i="0" u="none" strike="noStrike" dirty="0">
+                <a:effectLst/>
+              </a:rPr>
+              <a:t>Exercise collection: Create collection for </a:t>
+            </a:r>
+            <a:r>
+              <a:rPr lang="en-US" sz="1800" b="0" i="0" u="none" strike="noStrike" dirty="0" err="1">
+                <a:effectLst/>
+              </a:rPr>
+              <a:t>comon</a:t>
+            </a:r>
+            <a:r>
+              <a:rPr lang="en-US" sz="1800" b="0" i="0" u="none" strike="noStrike" dirty="0">
+                <a:effectLst/>
+              </a:rPr>
+              <a:t> exercises, make visible to all users.(1 day)</a:t>
+            </a:r>
+          </a:p>
+          <a:p>
+            <a:pPr algn="l">
+              <a:buFont typeface="+mj-lt"/>
+              <a:buAutoNum type="arabicPeriod"/>
+            </a:pPr>
+            <a:r>
+              <a:rPr lang="en-US" sz="1800" b="0" i="0" u="none" strike="noStrike" dirty="0">
+                <a:effectLst/>
+              </a:rPr>
+              <a:t>Exercise functions: Create JS functions to CRUD exercises. ( 2 days)</a:t>
+            </a:r>
+          </a:p>
+          <a:p>
+            <a:pPr algn="l">
+              <a:buFont typeface="+mj-lt"/>
+              <a:buAutoNum type="arabicPeriod"/>
+            </a:pPr>
+            <a:r>
+              <a:rPr lang="en-US" sz="1800" b="0" i="0" u="none" strike="noStrike" dirty="0">
+                <a:effectLst/>
+              </a:rPr>
+              <a:t>Routine collection: Create Database collections related to storing routines. Control edit/delete access by user. (1 day)</a:t>
+            </a:r>
+            <a:endParaRPr lang="en-US" sz="1800" dirty="0"/>
+          </a:p>
+        </p:txBody>
+      </p:sp>
+    </p:spTree>
+    <p:extLst>
+      <p:ext uri="{BB962C8B-B14F-4D97-AF65-F5344CB8AC3E}">
+        <p14:creationId xmlns:p14="http://schemas.microsoft.com/office/powerpoint/2010/main" val="1340545802"/>
+      </p:ext>
+    </p:extLst>
+  </p:cSld>
+  <p:clrMapOvr>
+    <a:masterClrMapping/>
+  </p:clrMapOvr>
+</p:sld>
+</file>
+
+<file path=ppt/slides/slide5.xml><?xml version="1.0" encoding="utf-8"?>
+<p:sld xmlns:a="http://schemas.openxmlformats.org/drawingml/2006/main" xmlns:r="http://schemas.openxmlformats.org/officeDocument/2006/relationships" xmlns:p="http://schemas.openxmlformats.org/presentationml/2006/main">
+  <p:cSld>
+    <p:spTree>
+      <p:nvGrpSpPr>
+        <p:cNvPr id="1" name=""/>
+        <p:cNvGrpSpPr/>
+        <p:nvPr/>
+      </p:nvGrpSpPr>
+      <p:grpSpPr>
+        <a:xfrm>
+          <a:off x="0" y="0"/>
+          <a:ext cx="0" cy="0"/>
+          <a:chOff x="0" y="0"/>
+          <a:chExt cx="0" cy="0"/>
+        </a:xfrm>
+      </p:grpSpPr>
+      <p:sp>
+        <p:nvSpPr>
+          <p:cNvPr id="2" name="Title 1">
+            <a:extLst>
+              <a:ext uri="{FF2B5EF4-FFF2-40B4-BE49-F238E27FC236}">
+                <a16:creationId xmlns:a16="http://schemas.microsoft.com/office/drawing/2014/main" id="{35F4DE91-1B91-61B8-2BF9-FAD89ADAEA29}"/>
+              </a:ext>
+            </a:extLst>
+          </p:cNvPr>
+          <p:cNvSpPr>
+            <a:spLocks noGrp="1"/>
+          </p:cNvSpPr>
+          <p:nvPr>
+            <p:ph type="title"/>
+          </p:nvPr>
+        </p:nvSpPr>
+        <p:spPr/>
+        <p:txBody>
+          <a:bodyPr/>
+          <a:lstStyle/>
+          <a:p>
+            <a:r>
+              <a:rPr lang="en-US" dirty="0"/>
+              <a:t>Development Timeline (2)</a:t>
+            </a:r>
+          </a:p>
+        </p:txBody>
+      </p:sp>
+      <p:sp>
+        <p:nvSpPr>
+          <p:cNvPr id="3" name="Content Placeholder 2">
+            <a:extLst>
+              <a:ext uri="{FF2B5EF4-FFF2-40B4-BE49-F238E27FC236}">
+                <a16:creationId xmlns:a16="http://schemas.microsoft.com/office/drawing/2014/main" id="{2FDB8832-B1FF-9F63-FF57-5823A8959CB9}"/>
+              </a:ext>
+            </a:extLst>
+          </p:cNvPr>
+          <p:cNvSpPr>
+            <a:spLocks noGrp="1"/>
+          </p:cNvSpPr>
+          <p:nvPr>
+            <p:ph idx="1"/>
+          </p:nvPr>
+        </p:nvSpPr>
+        <p:spPr>
+          <a:xfrm>
+            <a:off x="838200" y="1027906"/>
+            <a:ext cx="10515600" cy="4351338"/>
+          </a:xfrm>
+        </p:spPr>
+        <p:txBody>
+          <a:bodyPr>
+            <a:noAutofit/>
+          </a:bodyPr>
+          <a:lstStyle/>
+          <a:p>
+            <a:pPr algn="l">
+              <a:buFont typeface="+mj-lt"/>
+              <a:buAutoNum type="arabicPeriod"/>
+            </a:pPr>
+            <a:endParaRPr lang="en-US" sz="1700" b="0" i="0" u="none" strike="noStrike" dirty="0">
+              <a:effectLst/>
+            </a:endParaRPr>
+          </a:p>
+          <a:p>
+            <a:pPr marL="342900" indent="-342900" algn="l">
+              <a:buFont typeface="+mj-lt"/>
+              <a:buAutoNum type="arabicPeriod" startAt="11"/>
+            </a:pPr>
+            <a:r>
+              <a:rPr lang="en-US" sz="1700" b="0" i="0" u="none" strike="noStrike" dirty="0">
+                <a:effectLst/>
+              </a:rPr>
+              <a:t>Routine functions: Create JS functions to CRUD reviews.( 2 days)</a:t>
+            </a:r>
+          </a:p>
+          <a:p>
+            <a:pPr algn="l">
+              <a:buFont typeface="+mj-lt"/>
+              <a:buAutoNum type="arabicPeriod" startAt="11"/>
+            </a:pPr>
+            <a:r>
+              <a:rPr lang="en-US" sz="1700" b="0" i="0" u="none" strike="noStrike" dirty="0">
+                <a:effectLst/>
+              </a:rPr>
+              <a:t>Routine create frontend: Create view to create a new routine. (3 days)</a:t>
+            </a:r>
+          </a:p>
+          <a:p>
+            <a:pPr algn="l">
+              <a:buFont typeface="+mj-lt"/>
+              <a:buAutoNum type="arabicPeriod" startAt="11"/>
+            </a:pPr>
+            <a:r>
+              <a:rPr lang="en-US" sz="1700" b="0" i="0" u="none" strike="noStrike" dirty="0">
+                <a:effectLst/>
+              </a:rPr>
+              <a:t>Routine list frontend: Create page for viewing list of public routines created by all users. ( 1 day)</a:t>
+            </a:r>
+          </a:p>
+          <a:p>
+            <a:pPr algn="l">
+              <a:buFont typeface="+mj-lt"/>
+              <a:buAutoNum type="arabicPeriod" startAt="11"/>
+            </a:pPr>
+            <a:r>
+              <a:rPr lang="en-US" sz="1700" b="0" i="0" u="none" strike="noStrike" dirty="0">
+                <a:effectLst/>
+              </a:rPr>
+              <a:t>Routine </a:t>
+            </a:r>
+            <a:r>
+              <a:rPr lang="en-US" sz="1700" b="0" i="0" u="none" strike="noStrike" dirty="0" err="1">
+                <a:effectLst/>
+              </a:rPr>
+              <a:t>serach</a:t>
+            </a:r>
+            <a:r>
+              <a:rPr lang="en-US" sz="1700" b="0" i="0" u="none" strike="noStrike" dirty="0">
+                <a:effectLst/>
+              </a:rPr>
+              <a:t> </a:t>
+            </a:r>
+            <a:r>
+              <a:rPr lang="en-US" sz="1700" b="0" i="0" u="none" strike="noStrike" dirty="0" err="1">
+                <a:effectLst/>
+              </a:rPr>
+              <a:t>integraton</a:t>
+            </a:r>
+            <a:r>
+              <a:rPr lang="en-US" sz="1700" b="0" i="0" u="none" strike="noStrike" dirty="0">
+                <a:effectLst/>
+              </a:rPr>
+              <a:t>: Create JS functions to integrate with </a:t>
+            </a:r>
+            <a:r>
+              <a:rPr lang="en-US" sz="1700" b="0" i="0" u="none" strike="noStrike" dirty="0" err="1">
+                <a:effectLst/>
+              </a:rPr>
+              <a:t>Algolia</a:t>
+            </a:r>
+            <a:r>
+              <a:rPr lang="en-US" sz="1700" b="0" i="0" u="none" strike="noStrike" dirty="0">
+                <a:effectLst/>
+              </a:rPr>
+              <a:t> for </a:t>
+            </a:r>
+            <a:r>
+              <a:rPr lang="en-US" sz="1700" b="0" i="0" u="none" strike="noStrike" dirty="0" err="1">
+                <a:effectLst/>
+              </a:rPr>
+              <a:t>serach</a:t>
+            </a:r>
+            <a:r>
+              <a:rPr lang="en-US" sz="1700" b="0" i="0" u="none" strike="noStrike" dirty="0">
+                <a:effectLst/>
+              </a:rPr>
+              <a:t> of routines. (1 day)</a:t>
+            </a:r>
+          </a:p>
+          <a:p>
+            <a:pPr algn="l">
+              <a:buFont typeface="+mj-lt"/>
+              <a:buAutoNum type="arabicPeriod" startAt="11"/>
+            </a:pPr>
+            <a:r>
+              <a:rPr lang="en-US" sz="1700" b="0" i="0" u="none" strike="noStrike" dirty="0">
+                <a:effectLst/>
+              </a:rPr>
+              <a:t>Routine search frontend: Allow for searching of routines. Should allow for filtering on various database fields.(2 days)</a:t>
+            </a:r>
+          </a:p>
+          <a:p>
+            <a:pPr algn="l">
+              <a:buFont typeface="+mj-lt"/>
+              <a:buAutoNum type="arabicPeriod" startAt="11"/>
+            </a:pPr>
+            <a:r>
+              <a:rPr lang="en-US" sz="1700" b="0" i="0" u="none" strike="noStrike" dirty="0">
+                <a:effectLst/>
+              </a:rPr>
+              <a:t>Workout Collection: Create collection to track instances of working out. Must be associated with routines and only visible to user that created it.(1 day)</a:t>
+            </a:r>
+          </a:p>
+          <a:p>
+            <a:pPr algn="l">
+              <a:buFont typeface="+mj-lt"/>
+              <a:buAutoNum type="arabicPeriod" startAt="11"/>
+            </a:pPr>
+            <a:r>
+              <a:rPr lang="en-US" sz="1700" b="0" i="0" u="none" strike="noStrike" dirty="0">
+                <a:effectLst/>
+              </a:rPr>
+              <a:t>Workout Tracking functions: Create JS functions to CRUD workout data. ( 2 days)</a:t>
+            </a:r>
+          </a:p>
+          <a:p>
+            <a:pPr algn="l">
+              <a:buFont typeface="+mj-lt"/>
+              <a:buAutoNum type="arabicPeriod" startAt="11"/>
+            </a:pPr>
+            <a:r>
+              <a:rPr lang="en-US" sz="1700" b="0" i="0" u="none" strike="noStrike" dirty="0">
+                <a:effectLst/>
+              </a:rPr>
+              <a:t>Workout Editor frontend: Start a workout, then be guided through all exercises in a routine. Prompts for </a:t>
+            </a:r>
+            <a:r>
+              <a:rPr lang="en-US" sz="1700" b="0" i="0" u="none" strike="noStrike" dirty="0" err="1">
+                <a:effectLst/>
+              </a:rPr>
+              <a:t>weightsxreps</a:t>
+            </a:r>
+            <a:r>
+              <a:rPr lang="en-US" sz="1700" b="0" i="0" u="none" strike="noStrike" dirty="0">
+                <a:effectLst/>
+              </a:rPr>
+              <a:t> throughout. If first workout of routine, then ask for initial values. Workout controller should be aware of former workouts to dictate weight increases/decreases. These will be based on what is dictated by the routine. ( 3 days)</a:t>
+            </a:r>
+          </a:p>
+          <a:p>
+            <a:pPr algn="l">
+              <a:buFont typeface="+mj-lt"/>
+              <a:buAutoNum type="arabicPeriod" startAt="11"/>
+            </a:pPr>
+            <a:r>
+              <a:rPr lang="en-US" sz="1700" b="0" i="0" u="none" strike="noStrike" dirty="0">
+                <a:effectLst/>
+              </a:rPr>
+              <a:t>Workout list frontend: Get a list of each time you've worked out, and be able to open workout objects to see how you did. ( 1 day)</a:t>
+            </a:r>
+          </a:p>
+          <a:p>
+            <a:pPr algn="l">
+              <a:buFont typeface="+mj-lt"/>
+              <a:buAutoNum type="arabicPeriod" startAt="11"/>
+            </a:pPr>
+            <a:r>
+              <a:rPr lang="en-US" sz="1700" b="0" i="0" u="none" strike="noStrike" dirty="0">
+                <a:effectLst/>
+              </a:rPr>
+              <a:t>Homepage Frontend: A homepage that informs you of what workout is due for that day, and also provides access to all other features of the site. ( 2 days)</a:t>
+            </a:r>
+          </a:p>
+          <a:p>
+            <a:pPr algn="l">
+              <a:buFont typeface="+mj-lt"/>
+              <a:buAutoNum type="arabicPeriod" startAt="11"/>
+            </a:pPr>
+            <a:r>
+              <a:rPr lang="en-US" sz="1700" b="0" i="0" u="none" strike="noStrike" dirty="0">
+                <a:effectLst/>
+              </a:rPr>
+              <a:t>User profile frontend: Change your username, contact info, reported weight, age, and other details. ( 1 day)</a:t>
+            </a:r>
+          </a:p>
+          <a:p>
+            <a:pPr marL="0" indent="0">
+              <a:buNone/>
+            </a:pPr>
+            <a:endParaRPr lang="en-US" sz="1700" dirty="0"/>
+          </a:p>
+          <a:p>
+            <a:pPr marL="0" indent="0">
+              <a:buNone/>
+            </a:pPr>
+            <a:endParaRPr lang="en-US" sz="1700" dirty="0"/>
+          </a:p>
+        </p:txBody>
+      </p:sp>
+    </p:spTree>
+    <p:extLst>
+      <p:ext uri="{BB962C8B-B14F-4D97-AF65-F5344CB8AC3E}">
+        <p14:creationId xmlns:p14="http://schemas.microsoft.com/office/powerpoint/2010/main" val="2501764156"/>
+      </p:ext>
+    </p:extLst>
+  </p:cSld>
+  <p:clrMapOvr>
+    <a:masterClrMapping/>
+  </p:clrMapOvr>
+</p:sld>
+</file>
+
+<file path=ppt/slides/slide6.xml><?xml version="1.0" encoding="utf-8"?>
+<p:sld xmlns:a="http://schemas.openxmlformats.org/drawingml/2006/main" xmlns:r="http://schemas.openxmlformats.org/officeDocument/2006/relationships" xmlns:p="http://schemas.openxmlformats.org/presentationml/2006/main">
+  <p:cSld>
+    <p:spTree>
+      <p:nvGrpSpPr>
+        <p:cNvPr id="1" name=""/>
+        <p:cNvGrpSpPr/>
+        <p:nvPr/>
+      </p:nvGrpSpPr>
+      <p:grpSpPr>
+        <a:xfrm>
+          <a:off x="0" y="0"/>
+          <a:ext cx="0" cy="0"/>
+          <a:chOff x="0" y="0"/>
+          <a:chExt cx="0" cy="0"/>
+        </a:xfrm>
+      </p:grpSpPr>
+      <p:sp>
+        <p:nvSpPr>
+          <p:cNvPr id="2" name="Title 1">
+            <a:extLst>
+              <a:ext uri="{FF2B5EF4-FFF2-40B4-BE49-F238E27FC236}">
+                <a16:creationId xmlns:a16="http://schemas.microsoft.com/office/drawing/2014/main" id="{4A9F8C6B-6152-70F7-25C8-EC50335CBD1B}"/>
+              </a:ext>
+            </a:extLst>
+          </p:cNvPr>
+          <p:cNvSpPr>
+            <a:spLocks noGrp="1"/>
+          </p:cNvSpPr>
+          <p:nvPr>
+            <p:ph type="title"/>
+          </p:nvPr>
+        </p:nvSpPr>
+        <p:spPr>
+          <a:xfrm>
+            <a:off x="381000" y="377482"/>
+            <a:ext cx="3820297" cy="1325563"/>
+          </a:xfrm>
+        </p:spPr>
+        <p:txBody>
+          <a:bodyPr/>
+          <a:lstStyle/>
+          <a:p>
+            <a:r>
+              <a:rPr lang="en-US" dirty="0"/>
+              <a:t>System Architecture</a:t>
+            </a:r>
+          </a:p>
+        </p:txBody>
+      </p:sp>
+      <p:pic>
+        <p:nvPicPr>
+          <p:cNvPr id="5" name="Content Placeholder 4" descr="A picture containing diagram&#10;&#10;Description automatically generated">
+            <a:extLst>
+              <a:ext uri="{FF2B5EF4-FFF2-40B4-BE49-F238E27FC236}">
+                <a16:creationId xmlns:a16="http://schemas.microsoft.com/office/drawing/2014/main" id="{8AB2F394-E98B-4EBE-5056-E6D1F2874762}"/>
+              </a:ext>
+            </a:extLst>
+          </p:cNvPr>
+          <p:cNvPicPr>
+            <a:picLocks noGrp="1" noChangeAspect="1"/>
+          </p:cNvPicPr>
+          <p:nvPr>
+            <p:ph idx="1"/>
+          </p:nvPr>
+        </p:nvPicPr>
+        <p:blipFill>
+          <a:blip r:embed="rId2"/>
+          <a:stretch>
+            <a:fillRect/>
+          </a:stretch>
+        </p:blipFill>
+        <p:spPr>
+          <a:xfrm>
+            <a:off x="3447535" y="0"/>
+            <a:ext cx="8744465" cy="6854186"/>
+          </a:xfrm>
+        </p:spPr>
+      </p:pic>
+    </p:spTree>
+    <p:extLst>
+      <p:ext uri="{BB962C8B-B14F-4D97-AF65-F5344CB8AC3E}">
+        <p14:creationId xmlns:p14="http://schemas.microsoft.com/office/powerpoint/2010/main" val="241529845"/>
+      </p:ext>
+    </p:extLst>
+  </p:cSld>
+  <p:clrMapOvr>
+    <a:masterClrMapping/>
+  </p:clrMapOvr>
+</p:sld>
+</file>
+
+<file path=ppt/slides/slide7.xml><?xml version="1.0" encoding="utf-8"?>
+<p:sld xmlns:a="http://schemas.openxmlformats.org/drawingml/2006/main" xmlns:r="http://schemas.openxmlformats.org/officeDocument/2006/relationships" xmlns:p="http://schemas.openxmlformats.org/presentationml/2006/main">
+  <p:cSld>
+    <p:spTree>
+      <p:nvGrpSpPr>
+        <p:cNvPr id="1" name=""/>
+        <p:cNvGrpSpPr/>
+        <p:nvPr/>
+      </p:nvGrpSpPr>
+      <p:grpSpPr>
+        <a:xfrm>
+          <a:off x="0" y="0"/>
+          <a:ext cx="0" cy="0"/>
+          <a:chOff x="0" y="0"/>
+          <a:chExt cx="0" cy="0"/>
+        </a:xfrm>
+      </p:grpSpPr>
+      <p:sp>
+        <p:nvSpPr>
+          <p:cNvPr id="2" name="Title 1">
+            <a:extLst>
+              <a:ext uri="{FF2B5EF4-FFF2-40B4-BE49-F238E27FC236}">
+                <a16:creationId xmlns:a16="http://schemas.microsoft.com/office/drawing/2014/main" id="{E7EBA379-5B67-D0AA-BD2F-EBC46E345887}"/>
+              </a:ext>
+            </a:extLst>
+          </p:cNvPr>
+          <p:cNvSpPr>
+            <a:spLocks noGrp="1"/>
+          </p:cNvSpPr>
+          <p:nvPr>
+            <p:ph type="title"/>
+          </p:nvPr>
+        </p:nvSpPr>
+        <p:spPr/>
+        <p:txBody>
+          <a:bodyPr/>
+          <a:lstStyle/>
+          <a:p>
+            <a:r>
+              <a:rPr lang="en-US" dirty="0"/>
+              <a:t>Updated Tech Stack</a:t>
+            </a:r>
+          </a:p>
+        </p:txBody>
+      </p:sp>
+      <p:sp>
+        <p:nvSpPr>
+          <p:cNvPr id="3" name="Content Placeholder 2">
+            <a:extLst>
+              <a:ext uri="{FF2B5EF4-FFF2-40B4-BE49-F238E27FC236}">
+                <a16:creationId xmlns:a16="http://schemas.microsoft.com/office/drawing/2014/main" id="{C0CD66DF-2809-0C0A-46C2-E907A03D9109}"/>
+              </a:ext>
+            </a:extLst>
+          </p:cNvPr>
+          <p:cNvSpPr>
+            <a:spLocks noGrp="1"/>
+          </p:cNvSpPr>
+          <p:nvPr>
+            <p:ph idx="1"/>
+          </p:nvPr>
+        </p:nvSpPr>
+        <p:spPr/>
+        <p:txBody>
+          <a:bodyPr/>
+          <a:lstStyle/>
+          <a:p>
+            <a:pPr>
+              <a:buFontTx/>
+              <a:buChar char="-"/>
+            </a:pPr>
+            <a:r>
+              <a:rPr lang="en-US" dirty="0" err="1"/>
+              <a:t>Nuxt.js</a:t>
+            </a:r>
+            <a:r>
+              <a:rPr lang="en-US" dirty="0"/>
+              <a:t>/Vue frontend</a:t>
+            </a:r>
+          </a:p>
+          <a:p>
+            <a:pPr>
+              <a:buFontTx/>
+              <a:buChar char="-"/>
+            </a:pPr>
+            <a:r>
+              <a:rPr lang="en-US" dirty="0" err="1"/>
+              <a:t>Algolia</a:t>
+            </a:r>
+            <a:r>
+              <a:rPr lang="en-US" dirty="0"/>
+              <a:t> (Search)</a:t>
+            </a:r>
+          </a:p>
+          <a:p>
+            <a:pPr>
+              <a:buFontTx/>
+              <a:buChar char="-"/>
+            </a:pPr>
+            <a:r>
+              <a:rPr lang="en-US" dirty="0" err="1"/>
+              <a:t>Firestore</a:t>
+            </a:r>
+            <a:r>
+              <a:rPr lang="en-US" dirty="0"/>
+              <a:t> (Database)</a:t>
+            </a:r>
+          </a:p>
+          <a:p>
+            <a:pPr>
+              <a:buFontTx/>
+              <a:buChar char="-"/>
+            </a:pPr>
+            <a:r>
+              <a:rPr lang="en-US" dirty="0"/>
+              <a:t>Firebase Auth (Auth)</a:t>
+            </a:r>
+          </a:p>
+          <a:p>
+            <a:pPr>
+              <a:buFontTx/>
+              <a:buChar char="-"/>
+            </a:pPr>
+            <a:r>
+              <a:rPr lang="en-US" dirty="0" err="1"/>
+              <a:t>nvim</a:t>
+            </a:r>
+            <a:r>
+              <a:rPr lang="en-US" dirty="0"/>
+              <a:t> (text editor)</a:t>
+            </a:r>
+          </a:p>
+          <a:p>
+            <a:pPr>
+              <a:buFontTx/>
+              <a:buChar char="-"/>
+            </a:pPr>
+            <a:r>
+              <a:rPr lang="en-US" dirty="0" err="1"/>
+              <a:t>TailwindCSS</a:t>
+            </a:r>
+            <a:r>
+              <a:rPr lang="en-US" dirty="0"/>
+              <a:t> (CSS classes)</a:t>
+            </a:r>
+          </a:p>
+        </p:txBody>
+      </p:sp>
+    </p:spTree>
+    <p:extLst>
+      <p:ext uri="{BB962C8B-B14F-4D97-AF65-F5344CB8AC3E}">
+        <p14:creationId xmlns:p14="http://schemas.microsoft.com/office/powerpoint/2010/main" val="757098956"/>
+      </p:ext>
+    </p:extLst>
+  </p:cSld>
+  <p:clrMapOvr>
+    <a:masterClrMapping/>
+  </p:clrMapOvr>
+</p:sld>
+</file>
+
+<file path=ppt/slides/slide8.xml><?xml version="1.0" encoding="utf-8"?>
+<p:sld xmlns:a="http://schemas.openxmlformats.org/drawingml/2006/main" xmlns:r="http://schemas.openxmlformats.org/officeDocument/2006/relationships" xmlns:p="http://schemas.openxmlformats.org/presentationml/2006/main">
+  <p:cSld>
+    <p:spTree>
+      <p:nvGrpSpPr>
+        <p:cNvPr id="1" name=""/>
+        <p:cNvGrpSpPr/>
+        <p:nvPr/>
+      </p:nvGrpSpPr>
+      <p:grpSpPr>
+        <a:xfrm>
+          <a:off x="0" y="0"/>
+          <a:ext cx="0" cy="0"/>
+          <a:chOff x="0" y="0"/>
+          <a:chExt cx="0" cy="0"/>
+        </a:xfrm>
+      </p:grpSpPr>
+      <p:sp>
+        <p:nvSpPr>
+          <p:cNvPr id="2" name="Title 1">
+            <a:extLst>
+              <a:ext uri="{FF2B5EF4-FFF2-40B4-BE49-F238E27FC236}">
+                <a16:creationId xmlns:a16="http://schemas.microsoft.com/office/drawing/2014/main" id="{E6E71446-7CE9-91C8-EC52-0F5808A80124}"/>
+              </a:ext>
+            </a:extLst>
+          </p:cNvPr>
+          <p:cNvSpPr>
+            <a:spLocks noGrp="1"/>
+          </p:cNvSpPr>
+          <p:nvPr>
+            <p:ph type="title"/>
+          </p:nvPr>
+        </p:nvSpPr>
+        <p:spPr/>
+        <p:txBody>
+          <a:bodyPr/>
+          <a:lstStyle/>
+          <a:p>
+            <a:r>
+              <a:rPr lang="en-US" dirty="0"/>
+              <a:t>Data Flow Diagram</a:t>
+            </a:r>
+          </a:p>
+        </p:txBody>
+      </p:sp>
+      <p:pic>
+        <p:nvPicPr>
+          <p:cNvPr id="12" name="Content Placeholder 11">
+            <a:extLst>
+              <a:ext uri="{FF2B5EF4-FFF2-40B4-BE49-F238E27FC236}">
+                <a16:creationId xmlns:a16="http://schemas.microsoft.com/office/drawing/2014/main" id="{9CABA5BF-E75D-9330-25DA-6AE3DF37E4E8}"/>
+              </a:ext>
+            </a:extLst>
+          </p:cNvPr>
+          <p:cNvPicPr>
+            <a:picLocks noGrp="1" noChangeAspect="1"/>
+          </p:cNvPicPr>
+          <p:nvPr>
+            <p:ph idx="1"/>
+          </p:nvPr>
+        </p:nvPicPr>
+        <p:blipFill>
+          <a:blip r:embed="rId2"/>
+          <a:stretch>
+            <a:fillRect/>
+          </a:stretch>
+        </p:blipFill>
+        <p:spPr>
+          <a:xfrm>
+            <a:off x="1159644" y="1285103"/>
+            <a:ext cx="10074397" cy="5325762"/>
+          </a:xfrm>
+          <a:prstGeom prst="rect">
+            <a:avLst/>
+          </a:prstGeom>
+        </p:spPr>
+      </p:pic>
+    </p:spTree>
+    <p:extLst>
+      <p:ext uri="{BB962C8B-B14F-4D97-AF65-F5344CB8AC3E}">
+        <p14:creationId xmlns:p14="http://schemas.microsoft.com/office/powerpoint/2010/main" val="2554866279"/>
       </p:ext>
     </p:extLst>
   </p:cSld>

</xml_diff>

<commit_message>
Final changes to db definitions
</commit_message>
<xml_diff>
--- a/Documentation/Presentations/Presentation3.pptx
+++ b/Documentation/Presentations/Presentation3.pptx
@@ -4,17 +4,21 @@
   <p:sldMasterIdLst>
     <p:sldMasterId id="2147483648" r:id="rId1"/>
   </p:sldMasterIdLst>
+  <p:notesMasterIdLst>
+    <p:notesMasterId r:id="rId13"/>
+  </p:notesMasterIdLst>
   <p:sldIdLst>
     <p:sldId id="256" r:id="rId2"/>
     <p:sldId id="257" r:id="rId3"/>
-    <p:sldId id="265" r:id="rId4"/>
-    <p:sldId id="258" r:id="rId5"/>
-    <p:sldId id="259" r:id="rId6"/>
-    <p:sldId id="260" r:id="rId7"/>
-    <p:sldId id="261" r:id="rId8"/>
-    <p:sldId id="262" r:id="rId9"/>
+    <p:sldId id="258" r:id="rId4"/>
+    <p:sldId id="259" r:id="rId5"/>
+    <p:sldId id="260" r:id="rId6"/>
+    <p:sldId id="261" r:id="rId7"/>
+    <p:sldId id="262" r:id="rId8"/>
+    <p:sldId id="265" r:id="rId9"/>
     <p:sldId id="263" r:id="rId10"/>
     <p:sldId id="264" r:id="rId11"/>
+    <p:sldId id="266" r:id="rId12"/>
   </p:sldIdLst>
   <p:sldSz cx="12192000" cy="6858000"/>
   <p:notesSz cx="6858000" cy="9144000"/>
@@ -119,6 +123,439 @@
     </p:ext>
   </p:extLst>
 </p:presentation>
+</file>
+
+<file path=ppt/notesMasters/notesMaster1.xml><?xml version="1.0" encoding="utf-8"?>
+<p:notesMaster xmlns:a="http://schemas.openxmlformats.org/drawingml/2006/main" xmlns:r="http://schemas.openxmlformats.org/officeDocument/2006/relationships" xmlns:p="http://schemas.openxmlformats.org/presentationml/2006/main">
+  <p:cSld>
+    <p:bg>
+      <p:bgRef idx="1001">
+        <a:schemeClr val="bg1"/>
+      </p:bgRef>
+    </p:bg>
+    <p:spTree>
+      <p:nvGrpSpPr>
+        <p:cNvPr id="1" name=""/>
+        <p:cNvGrpSpPr/>
+        <p:nvPr/>
+      </p:nvGrpSpPr>
+      <p:grpSpPr>
+        <a:xfrm>
+          <a:off x="0" y="0"/>
+          <a:ext cx="0" cy="0"/>
+          <a:chOff x="0" y="0"/>
+          <a:chExt cx="0" cy="0"/>
+        </a:xfrm>
+      </p:grpSpPr>
+      <p:sp>
+        <p:nvSpPr>
+          <p:cNvPr id="2" name="Header Placeholder 1"/>
+          <p:cNvSpPr>
+            <a:spLocks noGrp="1"/>
+          </p:cNvSpPr>
+          <p:nvPr>
+            <p:ph type="hdr" sz="quarter"/>
+          </p:nvPr>
+        </p:nvSpPr>
+        <p:spPr>
+          <a:xfrm>
+            <a:off x="0" y="0"/>
+            <a:ext cx="2971800" cy="458788"/>
+          </a:xfrm>
+          <a:prstGeom prst="rect">
+            <a:avLst/>
+          </a:prstGeom>
+        </p:spPr>
+        <p:txBody>
+          <a:bodyPr vert="horz" lIns="91440" tIns="45720" rIns="91440" bIns="45720" rtlCol="0"/>
+          <a:lstStyle>
+            <a:lvl1pPr algn="l">
+              <a:defRPr sz="1200"/>
+            </a:lvl1pPr>
+          </a:lstStyle>
+          <a:p>
+            <a:endParaRPr lang="en-US"/>
+          </a:p>
+        </p:txBody>
+      </p:sp>
+      <p:sp>
+        <p:nvSpPr>
+          <p:cNvPr id="3" name="Date Placeholder 2"/>
+          <p:cNvSpPr>
+            <a:spLocks noGrp="1"/>
+          </p:cNvSpPr>
+          <p:nvPr>
+            <p:ph type="dt" idx="1"/>
+          </p:nvPr>
+        </p:nvSpPr>
+        <p:spPr>
+          <a:xfrm>
+            <a:off x="3884613" y="0"/>
+            <a:ext cx="2971800" cy="458788"/>
+          </a:xfrm>
+          <a:prstGeom prst="rect">
+            <a:avLst/>
+          </a:prstGeom>
+        </p:spPr>
+        <p:txBody>
+          <a:bodyPr vert="horz" lIns="91440" tIns="45720" rIns="91440" bIns="45720" rtlCol="0"/>
+          <a:lstStyle>
+            <a:lvl1pPr algn="r">
+              <a:defRPr sz="1200"/>
+            </a:lvl1pPr>
+          </a:lstStyle>
+          <a:p>
+            <a:fld id="{1B7E3597-ECDC-3741-8565-41AA9A58B1E4}" type="datetimeFigureOut">
+              <a:rPr lang="en-US" smtClean="0"/>
+              <a:t>2/13/23</a:t>
+            </a:fld>
+            <a:endParaRPr lang="en-US"/>
+          </a:p>
+        </p:txBody>
+      </p:sp>
+      <p:sp>
+        <p:nvSpPr>
+          <p:cNvPr id="4" name="Slide Image Placeholder 3"/>
+          <p:cNvSpPr>
+            <a:spLocks noGrp="1" noRot="1" noChangeAspect="1"/>
+          </p:cNvSpPr>
+          <p:nvPr>
+            <p:ph type="sldImg" idx="2"/>
+          </p:nvPr>
+        </p:nvSpPr>
+        <p:spPr>
+          <a:xfrm>
+            <a:off x="685800" y="1143000"/>
+            <a:ext cx="5486400" cy="3086100"/>
+          </a:xfrm>
+          <a:prstGeom prst="rect">
+            <a:avLst/>
+          </a:prstGeom>
+          <a:noFill/>
+          <a:ln w="12700">
+            <a:solidFill>
+              <a:prstClr val="black"/>
+            </a:solidFill>
+          </a:ln>
+        </p:spPr>
+        <p:txBody>
+          <a:bodyPr vert="horz" lIns="91440" tIns="45720" rIns="91440" bIns="45720" rtlCol="0" anchor="ctr"/>
+          <a:lstStyle/>
+          <a:p>
+            <a:endParaRPr lang="en-US"/>
+          </a:p>
+        </p:txBody>
+      </p:sp>
+      <p:sp>
+        <p:nvSpPr>
+          <p:cNvPr id="5" name="Notes Placeholder 4"/>
+          <p:cNvSpPr>
+            <a:spLocks noGrp="1"/>
+          </p:cNvSpPr>
+          <p:nvPr>
+            <p:ph type="body" sz="quarter" idx="3"/>
+          </p:nvPr>
+        </p:nvSpPr>
+        <p:spPr>
+          <a:xfrm>
+            <a:off x="685800" y="4400550"/>
+            <a:ext cx="5486400" cy="3600450"/>
+          </a:xfrm>
+          <a:prstGeom prst="rect">
+            <a:avLst/>
+          </a:prstGeom>
+        </p:spPr>
+        <p:txBody>
+          <a:bodyPr vert="horz" lIns="91440" tIns="45720" rIns="91440" bIns="45720" rtlCol="0"/>
+          <a:lstStyle/>
+          <a:p>
+            <a:pPr lvl="0"/>
+            <a:r>
+              <a:rPr lang="en-US"/>
+              <a:t>Click to edit Master text styles</a:t>
+            </a:r>
+          </a:p>
+          <a:p>
+            <a:pPr lvl="1"/>
+            <a:r>
+              <a:rPr lang="en-US"/>
+              <a:t>Second level</a:t>
+            </a:r>
+          </a:p>
+          <a:p>
+            <a:pPr lvl="2"/>
+            <a:r>
+              <a:rPr lang="en-US"/>
+              <a:t>Third level</a:t>
+            </a:r>
+          </a:p>
+          <a:p>
+            <a:pPr lvl="3"/>
+            <a:r>
+              <a:rPr lang="en-US"/>
+              <a:t>Fourth level</a:t>
+            </a:r>
+          </a:p>
+          <a:p>
+            <a:pPr lvl="4"/>
+            <a:r>
+              <a:rPr lang="en-US"/>
+              <a:t>Fifth level</a:t>
+            </a:r>
+          </a:p>
+        </p:txBody>
+      </p:sp>
+      <p:sp>
+        <p:nvSpPr>
+          <p:cNvPr id="6" name="Footer Placeholder 5"/>
+          <p:cNvSpPr>
+            <a:spLocks noGrp="1"/>
+          </p:cNvSpPr>
+          <p:nvPr>
+            <p:ph type="ftr" sz="quarter" idx="4"/>
+          </p:nvPr>
+        </p:nvSpPr>
+        <p:spPr>
+          <a:xfrm>
+            <a:off x="0" y="8685213"/>
+            <a:ext cx="2971800" cy="458787"/>
+          </a:xfrm>
+          <a:prstGeom prst="rect">
+            <a:avLst/>
+          </a:prstGeom>
+        </p:spPr>
+        <p:txBody>
+          <a:bodyPr vert="horz" lIns="91440" tIns="45720" rIns="91440" bIns="45720" rtlCol="0" anchor="b"/>
+          <a:lstStyle>
+            <a:lvl1pPr algn="l">
+              <a:defRPr sz="1200"/>
+            </a:lvl1pPr>
+          </a:lstStyle>
+          <a:p>
+            <a:endParaRPr lang="en-US"/>
+          </a:p>
+        </p:txBody>
+      </p:sp>
+      <p:sp>
+        <p:nvSpPr>
+          <p:cNvPr id="7" name="Slide Number Placeholder 6"/>
+          <p:cNvSpPr>
+            <a:spLocks noGrp="1"/>
+          </p:cNvSpPr>
+          <p:nvPr>
+            <p:ph type="sldNum" sz="quarter" idx="5"/>
+          </p:nvPr>
+        </p:nvSpPr>
+        <p:spPr>
+          <a:xfrm>
+            <a:off x="3884613" y="8685213"/>
+            <a:ext cx="2971800" cy="458787"/>
+          </a:xfrm>
+          <a:prstGeom prst="rect">
+            <a:avLst/>
+          </a:prstGeom>
+        </p:spPr>
+        <p:txBody>
+          <a:bodyPr vert="horz" lIns="91440" tIns="45720" rIns="91440" bIns="45720" rtlCol="0" anchor="b"/>
+          <a:lstStyle>
+            <a:lvl1pPr algn="r">
+              <a:defRPr sz="1200"/>
+            </a:lvl1pPr>
+          </a:lstStyle>
+          <a:p>
+            <a:fld id="{53640CE2-4A27-E04B-B971-07A2424928E0}" type="slidenum">
+              <a:rPr lang="en-US" smtClean="0"/>
+              <a:t>‹#›</a:t>
+            </a:fld>
+            <a:endParaRPr lang="en-US"/>
+          </a:p>
+        </p:txBody>
+      </p:sp>
+    </p:spTree>
+    <p:extLst>
+      <p:ext uri="{BB962C8B-B14F-4D97-AF65-F5344CB8AC3E}">
+        <p14:creationId xmlns:p14="http://schemas.microsoft.com/office/powerpoint/2010/main" val="1798354415"/>
+      </p:ext>
+    </p:extLst>
+  </p:cSld>
+  <p:clrMap bg1="lt1" tx1="dk1" bg2="lt2" tx2="dk2" accent1="accent1" accent2="accent2" accent3="accent3" accent4="accent4" accent5="accent5" accent6="accent6" hlink="hlink" folHlink="folHlink"/>
+  <p:notesStyle>
+    <a:lvl1pPr marL="0" algn="l" defTabSz="914400" rtl="0" eaLnBrk="1" latinLnBrk="0" hangingPunct="1">
+      <a:defRPr sz="1200" kern="1200">
+        <a:solidFill>
+          <a:schemeClr val="tx1"/>
+        </a:solidFill>
+        <a:latin typeface="+mn-lt"/>
+        <a:ea typeface="+mn-ea"/>
+        <a:cs typeface="+mn-cs"/>
+      </a:defRPr>
+    </a:lvl1pPr>
+    <a:lvl2pPr marL="457200" algn="l" defTabSz="914400" rtl="0" eaLnBrk="1" latinLnBrk="0" hangingPunct="1">
+      <a:defRPr sz="1200" kern="1200">
+        <a:solidFill>
+          <a:schemeClr val="tx1"/>
+        </a:solidFill>
+        <a:latin typeface="+mn-lt"/>
+        <a:ea typeface="+mn-ea"/>
+        <a:cs typeface="+mn-cs"/>
+      </a:defRPr>
+    </a:lvl2pPr>
+    <a:lvl3pPr marL="914400" algn="l" defTabSz="914400" rtl="0" eaLnBrk="1" latinLnBrk="0" hangingPunct="1">
+      <a:defRPr sz="1200" kern="1200">
+        <a:solidFill>
+          <a:schemeClr val="tx1"/>
+        </a:solidFill>
+        <a:latin typeface="+mn-lt"/>
+        <a:ea typeface="+mn-ea"/>
+        <a:cs typeface="+mn-cs"/>
+      </a:defRPr>
+    </a:lvl3pPr>
+    <a:lvl4pPr marL="1371600" algn="l" defTabSz="914400" rtl="0" eaLnBrk="1" latinLnBrk="0" hangingPunct="1">
+      <a:defRPr sz="1200" kern="1200">
+        <a:solidFill>
+          <a:schemeClr val="tx1"/>
+        </a:solidFill>
+        <a:latin typeface="+mn-lt"/>
+        <a:ea typeface="+mn-ea"/>
+        <a:cs typeface="+mn-cs"/>
+      </a:defRPr>
+    </a:lvl4pPr>
+    <a:lvl5pPr marL="1828800" algn="l" defTabSz="914400" rtl="0" eaLnBrk="1" latinLnBrk="0" hangingPunct="1">
+      <a:defRPr sz="1200" kern="1200">
+        <a:solidFill>
+          <a:schemeClr val="tx1"/>
+        </a:solidFill>
+        <a:latin typeface="+mn-lt"/>
+        <a:ea typeface="+mn-ea"/>
+        <a:cs typeface="+mn-cs"/>
+      </a:defRPr>
+    </a:lvl5pPr>
+    <a:lvl6pPr marL="2286000" algn="l" defTabSz="914400" rtl="0" eaLnBrk="1" latinLnBrk="0" hangingPunct="1">
+      <a:defRPr sz="1200" kern="1200">
+        <a:solidFill>
+          <a:schemeClr val="tx1"/>
+        </a:solidFill>
+        <a:latin typeface="+mn-lt"/>
+        <a:ea typeface="+mn-ea"/>
+        <a:cs typeface="+mn-cs"/>
+      </a:defRPr>
+    </a:lvl6pPr>
+    <a:lvl7pPr marL="2743200" algn="l" defTabSz="914400" rtl="0" eaLnBrk="1" latinLnBrk="0" hangingPunct="1">
+      <a:defRPr sz="1200" kern="1200">
+        <a:solidFill>
+          <a:schemeClr val="tx1"/>
+        </a:solidFill>
+        <a:latin typeface="+mn-lt"/>
+        <a:ea typeface="+mn-ea"/>
+        <a:cs typeface="+mn-cs"/>
+      </a:defRPr>
+    </a:lvl7pPr>
+    <a:lvl8pPr marL="3200400" algn="l" defTabSz="914400" rtl="0" eaLnBrk="1" latinLnBrk="0" hangingPunct="1">
+      <a:defRPr sz="1200" kern="1200">
+        <a:solidFill>
+          <a:schemeClr val="tx1"/>
+        </a:solidFill>
+        <a:latin typeface="+mn-lt"/>
+        <a:ea typeface="+mn-ea"/>
+        <a:cs typeface="+mn-cs"/>
+      </a:defRPr>
+    </a:lvl8pPr>
+    <a:lvl9pPr marL="3657600" algn="l" defTabSz="914400" rtl="0" eaLnBrk="1" latinLnBrk="0" hangingPunct="1">
+      <a:defRPr sz="1200" kern="1200">
+        <a:solidFill>
+          <a:schemeClr val="tx1"/>
+        </a:solidFill>
+        <a:latin typeface="+mn-lt"/>
+        <a:ea typeface="+mn-ea"/>
+        <a:cs typeface="+mn-cs"/>
+      </a:defRPr>
+    </a:lvl9pPr>
+  </p:notesStyle>
+</p:notesMaster>
+</file>
+
+<file path=ppt/notesSlides/notesSlide1.xml><?xml version="1.0" encoding="utf-8"?>
+<p:notes xmlns:a="http://schemas.openxmlformats.org/drawingml/2006/main" xmlns:r="http://schemas.openxmlformats.org/officeDocument/2006/relationships" xmlns:p="http://schemas.openxmlformats.org/presentationml/2006/main">
+  <p:cSld>
+    <p:spTree>
+      <p:nvGrpSpPr>
+        <p:cNvPr id="1" name=""/>
+        <p:cNvGrpSpPr/>
+        <p:nvPr/>
+      </p:nvGrpSpPr>
+      <p:grpSpPr>
+        <a:xfrm>
+          <a:off x="0" y="0"/>
+          <a:ext cx="0" cy="0"/>
+          <a:chOff x="0" y="0"/>
+          <a:chExt cx="0" cy="0"/>
+        </a:xfrm>
+      </p:grpSpPr>
+      <p:sp>
+        <p:nvSpPr>
+          <p:cNvPr id="2" name="Slide Image Placeholder 1"/>
+          <p:cNvSpPr>
+            <a:spLocks noGrp="1" noRot="1" noChangeAspect="1"/>
+          </p:cNvSpPr>
+          <p:nvPr>
+            <p:ph type="sldImg"/>
+          </p:nvPr>
+        </p:nvSpPr>
+        <p:spPr/>
+      </p:sp>
+      <p:sp>
+        <p:nvSpPr>
+          <p:cNvPr id="3" name="Notes Placeholder 2"/>
+          <p:cNvSpPr>
+            <a:spLocks noGrp="1"/>
+          </p:cNvSpPr>
+          <p:nvPr>
+            <p:ph type="body" idx="1"/>
+          </p:nvPr>
+        </p:nvSpPr>
+        <p:spPr/>
+        <p:txBody>
+          <a:bodyPr/>
+          <a:lstStyle/>
+          <a:p>
+            <a:endParaRPr lang="en-US" dirty="0"/>
+          </a:p>
+        </p:txBody>
+      </p:sp>
+      <p:sp>
+        <p:nvSpPr>
+          <p:cNvPr id="4" name="Slide Number Placeholder 3"/>
+          <p:cNvSpPr>
+            <a:spLocks noGrp="1"/>
+          </p:cNvSpPr>
+          <p:nvPr>
+            <p:ph type="sldNum" sz="quarter" idx="5"/>
+          </p:nvPr>
+        </p:nvSpPr>
+        <p:spPr/>
+        <p:txBody>
+          <a:bodyPr/>
+          <a:lstStyle/>
+          <a:p>
+            <a:fld id="{53640CE2-4A27-E04B-B971-07A2424928E0}" type="slidenum">
+              <a:rPr lang="en-US" smtClean="0"/>
+              <a:t>1</a:t>
+            </a:fld>
+            <a:endParaRPr lang="en-US"/>
+          </a:p>
+        </p:txBody>
+      </p:sp>
+    </p:spTree>
+    <p:extLst>
+      <p:ext uri="{BB962C8B-B14F-4D97-AF65-F5344CB8AC3E}">
+        <p14:creationId xmlns:p14="http://schemas.microsoft.com/office/powerpoint/2010/main" val="2243362241"/>
+      </p:ext>
+    </p:extLst>
+  </p:cSld>
+  <p:clrMapOvr>
+    <a:masterClrMapping/>
+  </p:clrMapOvr>
+</p:notes>
 </file>
 
 <file path=ppt/slideLayouts/slideLayout1.xml><?xml version="1.0" encoding="utf-8"?>
@@ -3497,6 +3934,95 @@
 </p:sld>
 </file>
 
+<file path=ppt/slides/slide11.xml><?xml version="1.0" encoding="utf-8"?>
+<p:sld xmlns:a="http://schemas.openxmlformats.org/drawingml/2006/main" xmlns:r="http://schemas.openxmlformats.org/officeDocument/2006/relationships" xmlns:p="http://schemas.openxmlformats.org/presentationml/2006/main">
+  <p:cSld>
+    <p:spTree>
+      <p:nvGrpSpPr>
+        <p:cNvPr id="1" name=""/>
+        <p:cNvGrpSpPr/>
+        <p:nvPr/>
+      </p:nvGrpSpPr>
+      <p:grpSpPr>
+        <a:xfrm>
+          <a:off x="0" y="0"/>
+          <a:ext cx="0" cy="0"/>
+          <a:chOff x="0" y="0"/>
+          <a:chExt cx="0" cy="0"/>
+        </a:xfrm>
+      </p:grpSpPr>
+      <p:sp>
+        <p:nvSpPr>
+          <p:cNvPr id="2" name="Title 1">
+            <a:extLst>
+              <a:ext uri="{FF2B5EF4-FFF2-40B4-BE49-F238E27FC236}">
+                <a16:creationId xmlns:a16="http://schemas.microsoft.com/office/drawing/2014/main" id="{C4ABEA95-27C1-EC0E-62A9-025E50FAEB49}"/>
+              </a:ext>
+            </a:extLst>
+          </p:cNvPr>
+          <p:cNvSpPr>
+            <a:spLocks noGrp="1"/>
+          </p:cNvSpPr>
+          <p:nvPr>
+            <p:ph type="title"/>
+          </p:nvPr>
+        </p:nvSpPr>
+        <p:spPr/>
+        <p:txBody>
+          <a:bodyPr/>
+          <a:lstStyle/>
+          <a:p>
+            <a:r>
+              <a:rPr lang="en-US" dirty="0"/>
+              <a:t>Database Definitions</a:t>
+            </a:r>
+          </a:p>
+        </p:txBody>
+      </p:sp>
+      <p:sp>
+        <p:nvSpPr>
+          <p:cNvPr id="3" name="Content Placeholder 2">
+            <a:extLst>
+              <a:ext uri="{FF2B5EF4-FFF2-40B4-BE49-F238E27FC236}">
+                <a16:creationId xmlns:a16="http://schemas.microsoft.com/office/drawing/2014/main" id="{5557B83C-DED4-5A6B-9E17-F92C94761A09}"/>
+              </a:ext>
+            </a:extLst>
+          </p:cNvPr>
+          <p:cNvSpPr>
+            <a:spLocks noGrp="1"/>
+          </p:cNvSpPr>
+          <p:nvPr>
+            <p:ph idx="1"/>
+          </p:nvPr>
+        </p:nvSpPr>
+        <p:spPr/>
+        <p:txBody>
+          <a:bodyPr/>
+          <a:lstStyle/>
+          <a:p>
+            <a:pPr marL="0" indent="0">
+              <a:buNone/>
+            </a:pPr>
+            <a:r>
+              <a:rPr lang="en-US" dirty="0"/>
+              <a:t>[ see GitHub ] </a:t>
+            </a:r>
+          </a:p>
+        </p:txBody>
+      </p:sp>
+    </p:spTree>
+    <p:extLst>
+      <p:ext uri="{BB962C8B-B14F-4D97-AF65-F5344CB8AC3E}">
+        <p14:creationId xmlns:p14="http://schemas.microsoft.com/office/powerpoint/2010/main" val="3387470301"/>
+      </p:ext>
+    </p:extLst>
+  </p:cSld>
+  <p:clrMapOvr>
+    <a:masterClrMapping/>
+  </p:clrMapOvr>
+</p:sld>
+</file>
+
 <file path=ppt/slides/slide2.xml><?xml version="1.0" encoding="utf-8"?>
 <p:sld xmlns:a="http://schemas.openxmlformats.org/drawingml/2006/main" xmlns:r="http://schemas.openxmlformats.org/officeDocument/2006/relationships" xmlns:p="http://schemas.openxmlformats.org/presentationml/2006/main">
   <p:cSld>
@@ -3589,20 +4115,8 @@
             </a:pPr>
             <a:r>
               <a:rPr lang="en-US" dirty="0"/>
-              <a:t>As such, here are updated diagrams and timelines:</a:t>
-            </a:r>
-          </a:p>
-          <a:p>
-            <a:pPr marL="457200" lvl="1" indent="0">
-              <a:buNone/>
-            </a:pPr>
-            <a:r>
-              <a:rPr lang="en-US" dirty="0">
-                <a:hlinkClick r:id="rId2"/>
-              </a:rPr>
-              <a:t>My Documentation</a:t>
-            </a:r>
-            <a:endParaRPr lang="en-US" dirty="0"/>
+              <a:t>As such, here are updated diagrams and timelines</a:t>
+            </a:r>
           </a:p>
         </p:txBody>
       </p:sp>
@@ -3641,7 +4155,7 @@
           <p:cNvPr id="2" name="Title 1">
             <a:extLst>
               <a:ext uri="{FF2B5EF4-FFF2-40B4-BE49-F238E27FC236}">
-                <a16:creationId xmlns:a16="http://schemas.microsoft.com/office/drawing/2014/main" id="{D2DB3EAF-DAA3-A378-EF54-E1D844942DC2}"/>
+                <a16:creationId xmlns:a16="http://schemas.microsoft.com/office/drawing/2014/main" id="{8957AED6-FA5C-D208-59B6-B8783A2CB32D}"/>
               </a:ext>
             </a:extLst>
           </p:cNvPr>
@@ -3659,7 +4173,7 @@
           <a:p>
             <a:r>
               <a:rPr lang="en-US" dirty="0"/>
-              <a:t>Other Notes</a:t>
+              <a:t>Design Timeline</a:t>
             </a:r>
           </a:p>
         </p:txBody>
@@ -3669,7 +4183,7 @@
           <p:cNvPr id="3" name="Content Placeholder 2">
             <a:extLst>
               <a:ext uri="{FF2B5EF4-FFF2-40B4-BE49-F238E27FC236}">
-                <a16:creationId xmlns:a16="http://schemas.microsoft.com/office/drawing/2014/main" id="{2DA5D62F-6262-DE29-34BC-815ECE17A96D}"/>
+                <a16:creationId xmlns:a16="http://schemas.microsoft.com/office/drawing/2014/main" id="{7D13B4C5-EA38-EF61-0274-5229C766C96E}"/>
               </a:ext>
             </a:extLst>
           </p:cNvPr>
@@ -3682,27 +4196,175 @@
         </p:nvSpPr>
         <p:spPr/>
         <p:txBody>
-          <a:bodyPr/>
-          <a:lstStyle/>
-          <a:p>
-            <a:pPr marL="0" indent="0">
-              <a:buNone/>
+          <a:bodyPr>
+            <a:noAutofit/>
+          </a:bodyPr>
+          <a:lstStyle/>
+          <a:p>
+            <a:pPr algn="l">
+              <a:buFont typeface="+mj-lt"/>
+              <a:buAutoNum type="arabicPeriod"/>
             </a:pPr>
             <a:r>
-              <a:rPr lang="en-US" dirty="0"/>
-              <a:t>- I dropped the System Sequence Diagram because given the amount of time I have, the user flow diagram does enough of the </a:t>
-            </a:r>
-            <a:r>
-              <a:rPr lang="en-US"/>
-              <a:t>same things for me.</a:t>
-            </a:r>
+              <a:rPr lang="en-US" sz="1800" b="0" i="0" u="none" strike="noStrike" dirty="0">
+                <a:effectLst/>
+              </a:rPr>
+              <a:t>Use Case diagram (1 day)</a:t>
+            </a:r>
+          </a:p>
+          <a:p>
+            <a:pPr algn="l">
+              <a:buFont typeface="+mj-lt"/>
+              <a:buAutoNum type="arabicPeriod"/>
+            </a:pPr>
+            <a:r>
+              <a:rPr lang="en-US" sz="1800" b="0" i="0" u="none" strike="noStrike" dirty="0">
+                <a:effectLst/>
+              </a:rPr>
+              <a:t>System Architecture diagram (1 day)</a:t>
+            </a:r>
+          </a:p>
+          <a:p>
+            <a:pPr algn="l">
+              <a:buFont typeface="+mj-lt"/>
+              <a:buAutoNum type="arabicPeriod"/>
+            </a:pPr>
+            <a:r>
+              <a:rPr lang="en-US" sz="1800" b="0" i="0" u="none" strike="noStrike" dirty="0">
+                <a:effectLst/>
+              </a:rPr>
+              <a:t>Data Flow, User Flow, System Sequence Diagrams (2 days)</a:t>
+            </a:r>
+          </a:p>
+          <a:p>
+            <a:pPr algn="l">
+              <a:buFont typeface="+mj-lt"/>
+              <a:buAutoNum type="arabicPeriod"/>
+            </a:pPr>
+            <a:r>
+              <a:rPr lang="en-US" sz="1800" b="0" i="0" u="none" strike="noStrike" dirty="0">
+                <a:effectLst/>
+              </a:rPr>
+              <a:t>Database diagram (2 days)</a:t>
+            </a:r>
+          </a:p>
+          <a:p>
+            <a:pPr algn="l">
+              <a:buFont typeface="+mj-lt"/>
+              <a:buAutoNum type="arabicPeriod"/>
+            </a:pPr>
+            <a:r>
+              <a:rPr lang="en-US" sz="1800" b="0" i="0" u="none" strike="noStrike" dirty="0">
+                <a:effectLst/>
+              </a:rPr>
+              <a:t>UI Design ( 2 weeks). Each includes computer, tablet, and mobile layouts. Excess time will be used for refinement.</a:t>
+            </a:r>
+          </a:p>
+          <a:p>
+            <a:pPr marL="742950" lvl="1" indent="-285750" algn="l">
+              <a:buFont typeface="+mj-lt"/>
+              <a:buAutoNum type="arabicPeriod"/>
+            </a:pPr>
+            <a:r>
+              <a:rPr lang="en-US" sz="1800" b="0" i="0" u="none" strike="noStrike" dirty="0">
+                <a:effectLst/>
+              </a:rPr>
+              <a:t>Homepage ( 1 day)</a:t>
+            </a:r>
+          </a:p>
+          <a:p>
+            <a:pPr marL="742950" lvl="1" indent="-285750" algn="l">
+              <a:buFont typeface="+mj-lt"/>
+              <a:buAutoNum type="arabicPeriod"/>
+            </a:pPr>
+            <a:r>
+              <a:rPr lang="en-US" sz="1800" b="0" i="0" u="none" strike="noStrike" dirty="0">
+                <a:effectLst/>
+              </a:rPr>
+              <a:t>Routine Creator (3 days)</a:t>
+            </a:r>
+          </a:p>
+          <a:p>
+            <a:pPr marL="742950" lvl="1" indent="-285750" algn="l">
+              <a:buFont typeface="+mj-lt"/>
+              <a:buAutoNum type="arabicPeriod"/>
+            </a:pPr>
+            <a:r>
+              <a:rPr lang="en-US" sz="1800" b="0" i="0" u="none" strike="noStrike" dirty="0">
+                <a:effectLst/>
+              </a:rPr>
+              <a:t>Routine Viewer ( 1 day)</a:t>
+            </a:r>
+          </a:p>
+          <a:p>
+            <a:pPr marL="742950" lvl="1" indent="-285750" algn="l">
+              <a:buFont typeface="+mj-lt"/>
+              <a:buAutoNum type="arabicPeriod"/>
+            </a:pPr>
+            <a:r>
+              <a:rPr lang="en-US" sz="1800" b="0" i="0" u="none" strike="noStrike" dirty="0">
+                <a:effectLst/>
+              </a:rPr>
+              <a:t>Routine Search ( 1 day)</a:t>
+            </a:r>
+          </a:p>
+          <a:p>
+            <a:pPr marL="742950" lvl="1" indent="-285750" algn="l">
+              <a:buFont typeface="+mj-lt"/>
+              <a:buAutoNum type="arabicPeriod"/>
+            </a:pPr>
+            <a:r>
+              <a:rPr lang="en-US" sz="1800" b="0" i="0" u="none" strike="noStrike" dirty="0">
+                <a:effectLst/>
+              </a:rPr>
+              <a:t>Workout Editor ( 2 days)</a:t>
+            </a:r>
+          </a:p>
+          <a:p>
+            <a:pPr marL="742950" lvl="1" indent="-285750" algn="l">
+              <a:buFont typeface="+mj-lt"/>
+              <a:buAutoNum type="arabicPeriod"/>
+            </a:pPr>
+            <a:r>
+              <a:rPr lang="en-US" sz="1800" b="0" i="0" u="none" strike="noStrike" dirty="0">
+                <a:effectLst/>
+              </a:rPr>
+              <a:t>Workout List ( 1 day)</a:t>
+            </a:r>
+          </a:p>
+          <a:p>
+            <a:pPr marL="742950" lvl="1" indent="-285750" algn="l">
+              <a:buFont typeface="+mj-lt"/>
+              <a:buAutoNum type="arabicPeriod"/>
+            </a:pPr>
+            <a:r>
+              <a:rPr lang="en-US" sz="1800" b="0" i="0" u="none" strike="noStrike" dirty="0">
+                <a:effectLst/>
+              </a:rPr>
+              <a:t>Login/Register ( 1 day)</a:t>
+            </a:r>
+          </a:p>
+          <a:p>
+            <a:pPr marL="742950" lvl="1" indent="-285750" algn="l">
+              <a:buFont typeface="+mj-lt"/>
+              <a:buAutoNum type="arabicPeriod"/>
+            </a:pPr>
+            <a:r>
+              <a:rPr lang="en-US" sz="1800" b="0" i="0" u="none" strike="noStrike" dirty="0">
+                <a:effectLst/>
+              </a:rPr>
+              <a:t>Profile( 1 day)</a:t>
+            </a:r>
+          </a:p>
+          <a:p>
+            <a:endParaRPr lang="en-US" sz="1800" dirty="0"/>
           </a:p>
         </p:txBody>
       </p:sp>
     </p:spTree>
     <p:extLst>
       <p:ext uri="{BB962C8B-B14F-4D97-AF65-F5344CB8AC3E}">
-        <p14:creationId xmlns:p14="http://schemas.microsoft.com/office/powerpoint/2010/main" val="3129820154"/>
+        <p14:creationId xmlns:p14="http://schemas.microsoft.com/office/powerpoint/2010/main" val="181545781"/>
       </p:ext>
     </p:extLst>
   </p:cSld>
@@ -3734,7 +4396,7 @@
           <p:cNvPr id="2" name="Title 1">
             <a:extLst>
               <a:ext uri="{FF2B5EF4-FFF2-40B4-BE49-F238E27FC236}">
-                <a16:creationId xmlns:a16="http://schemas.microsoft.com/office/drawing/2014/main" id="{8957AED6-FA5C-D208-59B6-B8783A2CB32D}"/>
+                <a16:creationId xmlns:a16="http://schemas.microsoft.com/office/drawing/2014/main" id="{EBACC91F-062D-CF0C-9791-8677B1AC4D2F}"/>
               </a:ext>
             </a:extLst>
           </p:cNvPr>
@@ -3752,7 +4414,7 @@
           <a:p>
             <a:r>
               <a:rPr lang="en-US" dirty="0"/>
-              <a:t>Design Timeline</a:t>
+              <a:t>Development Timeline</a:t>
             </a:r>
           </a:p>
         </p:txBody>
@@ -3762,7 +4424,7 @@
           <p:cNvPr id="3" name="Content Placeholder 2">
             <a:extLst>
               <a:ext uri="{FF2B5EF4-FFF2-40B4-BE49-F238E27FC236}">
-                <a16:creationId xmlns:a16="http://schemas.microsoft.com/office/drawing/2014/main" id="{7D13B4C5-EA38-EF61-0274-5229C766C96E}"/>
+                <a16:creationId xmlns:a16="http://schemas.microsoft.com/office/drawing/2014/main" id="{4367105D-6627-EE6C-A923-357747089108}"/>
               </a:ext>
             </a:extLst>
           </p:cNvPr>
@@ -3779,6 +4441,20 @@
             <a:noAutofit/>
           </a:bodyPr>
           <a:lstStyle/>
+          <a:p>
+            <a:pPr marL="0" indent="0" algn="l">
+              <a:buNone/>
+            </a:pPr>
+            <a:r>
+              <a:rPr lang="en-US" sz="1800" b="1" i="0" u="none" strike="noStrike" dirty="0">
+                <a:effectLst/>
+              </a:rPr>
+              <a:t>Test cases should be created before starting on each component.</a:t>
+            </a:r>
+            <a:endParaRPr lang="en-US" sz="1800" b="0" i="0" u="none" strike="noStrike" dirty="0">
+              <a:effectLst/>
+            </a:endParaRPr>
+          </a:p>
           <a:p>
             <a:pPr algn="l">
               <a:buFont typeface="+mj-lt"/>
@@ -3788,7 +4464,7 @@
               <a:rPr lang="en-US" sz="1800" b="0" i="0" u="none" strike="noStrike" dirty="0">
                 <a:effectLst/>
               </a:rPr>
-              <a:t>Use Case diagram (1 day)</a:t>
+              <a:t>Fit Test: Create ultra-barebones frontend and database, test CRUD of basic data. (1 day)</a:t>
             </a:r>
           </a:p>
           <a:p>
@@ -3800,7 +4476,7 @@
               <a:rPr lang="en-US" sz="1800" b="0" i="0" u="none" strike="noStrike" dirty="0">
                 <a:effectLst/>
               </a:rPr>
-              <a:t>System Architecture diagram (1 day)</a:t>
+              <a:t>User Collection: Create the collection for user accounts.( 1/2 day)</a:t>
             </a:r>
           </a:p>
           <a:p>
@@ -3812,7 +4488,7 @@
               <a:rPr lang="en-US" sz="1800" b="0" i="0" u="none" strike="noStrike" dirty="0">
                 <a:effectLst/>
               </a:rPr>
-              <a:t>Data Flow, User Flow, System Sequence Diagrams (2 days)</a:t>
+              <a:t>User Functions; Create JS functions to handle user data CRUD (2 days)</a:t>
             </a:r>
           </a:p>
           <a:p>
@@ -3824,7 +4500,7 @@
               <a:rPr lang="en-US" sz="1800" b="0" i="0" u="none" strike="noStrike" dirty="0">
                 <a:effectLst/>
               </a:rPr>
-              <a:t>Database diagram (2 days)</a:t>
+              <a:t>User Authorization: Add firebase auth to frontend (1 day)</a:t>
             </a:r>
           </a:p>
           <a:p>
@@ -3836,11 +4512,11 @@
               <a:rPr lang="en-US" sz="1800" b="0" i="0" u="none" strike="noStrike" dirty="0">
                 <a:effectLst/>
               </a:rPr>
-              <a:t>UI Design ( 2 weeks). Each includes computer, tablet, and mobile layouts. Excess time will be used for refinement.</a:t>
-            </a:r>
-          </a:p>
-          <a:p>
-            <a:pPr marL="742950" lvl="1" indent="-285750" algn="l">
+              <a:t>Login frontend: Create frontend page to login a user and send them to dummy homepage.(1 day)</a:t>
+            </a:r>
+          </a:p>
+          <a:p>
+            <a:pPr algn="l">
               <a:buFont typeface="+mj-lt"/>
               <a:buAutoNum type="arabicPeriod"/>
             </a:pPr>
@@ -3848,11 +4524,11 @@
               <a:rPr lang="en-US" sz="1800" b="0" i="0" u="none" strike="noStrike" dirty="0">
                 <a:effectLst/>
               </a:rPr>
-              <a:t>Homepage ( 1 day)</a:t>
-            </a:r>
-          </a:p>
-          <a:p>
-            <a:pPr marL="742950" lvl="1" indent="-285750" algn="l">
+              <a:t>Register frontend: Create registration page to create new users.(1 day)</a:t>
+            </a:r>
+          </a:p>
+          <a:p>
+            <a:pPr algn="l">
               <a:buFont typeface="+mj-lt"/>
               <a:buAutoNum type="arabicPeriod"/>
             </a:pPr>
@@ -3860,11 +4536,11 @@
               <a:rPr lang="en-US" sz="1800" b="0" i="0" u="none" strike="noStrike" dirty="0">
                 <a:effectLst/>
               </a:rPr>
-              <a:t>Routine Creator (3 days)</a:t>
-            </a:r>
-          </a:p>
-          <a:p>
-            <a:pPr marL="742950" lvl="1" indent="-285750" algn="l">
+              <a:t>Navbar: Create site navigation bar. (1 day)</a:t>
+            </a:r>
+          </a:p>
+          <a:p>
+            <a:pPr algn="l">
               <a:buFont typeface="+mj-lt"/>
               <a:buAutoNum type="arabicPeriod"/>
             </a:pPr>
@@ -3872,11 +4548,23 @@
               <a:rPr lang="en-US" sz="1800" b="0" i="0" u="none" strike="noStrike" dirty="0">
                 <a:effectLst/>
               </a:rPr>
-              <a:t>Routine Viewer ( 1 day)</a:t>
-            </a:r>
-          </a:p>
-          <a:p>
-            <a:pPr marL="742950" lvl="1" indent="-285750" algn="l">
+              <a:t>Exercise collection: Create collection for </a:t>
+            </a:r>
+            <a:r>
+              <a:rPr lang="en-US" sz="1800" b="0" i="0" u="none" strike="noStrike" dirty="0" err="1">
+                <a:effectLst/>
+              </a:rPr>
+              <a:t>comon</a:t>
+            </a:r>
+            <a:r>
+              <a:rPr lang="en-US" sz="1800" b="0" i="0" u="none" strike="noStrike" dirty="0">
+                <a:effectLst/>
+              </a:rPr>
+              <a:t> exercises, make visible to all users.(1 day)</a:t>
+            </a:r>
+          </a:p>
+          <a:p>
+            <a:pPr algn="l">
               <a:buFont typeface="+mj-lt"/>
               <a:buAutoNum type="arabicPeriod"/>
             </a:pPr>
@@ -3884,11 +4572,11 @@
               <a:rPr lang="en-US" sz="1800" b="0" i="0" u="none" strike="noStrike" dirty="0">
                 <a:effectLst/>
               </a:rPr>
-              <a:t>Routine Search ( 1 day)</a:t>
-            </a:r>
-          </a:p>
-          <a:p>
-            <a:pPr marL="742950" lvl="1" indent="-285750" algn="l">
+              <a:t>Exercise functions: Create JS functions to CRUD exercises. ( 2 days)</a:t>
+            </a:r>
+          </a:p>
+          <a:p>
+            <a:pPr algn="l">
               <a:buFont typeface="+mj-lt"/>
               <a:buAutoNum type="arabicPeriod"/>
             </a:pPr>
@@ -3896,46 +4584,8 @@
               <a:rPr lang="en-US" sz="1800" b="0" i="0" u="none" strike="noStrike" dirty="0">
                 <a:effectLst/>
               </a:rPr>
-              <a:t>Workout Editor ( 2 days)</a:t>
-            </a:r>
-          </a:p>
-          <a:p>
-            <a:pPr marL="742950" lvl="1" indent="-285750" algn="l">
-              <a:buFont typeface="+mj-lt"/>
-              <a:buAutoNum type="arabicPeriod"/>
-            </a:pPr>
-            <a:r>
-              <a:rPr lang="en-US" sz="1800" b="0" i="0" u="none" strike="noStrike" dirty="0">
-                <a:effectLst/>
-              </a:rPr>
-              <a:t>Workout List ( 1 day)</a:t>
-            </a:r>
-          </a:p>
-          <a:p>
-            <a:pPr marL="742950" lvl="1" indent="-285750" algn="l">
-              <a:buFont typeface="+mj-lt"/>
-              <a:buAutoNum type="arabicPeriod"/>
-            </a:pPr>
-            <a:r>
-              <a:rPr lang="en-US" sz="1800" b="0" i="0" u="none" strike="noStrike" dirty="0">
-                <a:effectLst/>
-              </a:rPr>
-              <a:t>Login/Register ( 1 day)</a:t>
-            </a:r>
-          </a:p>
-          <a:p>
-            <a:pPr marL="742950" lvl="1" indent="-285750" algn="l">
-              <a:buFont typeface="+mj-lt"/>
-              <a:buAutoNum type="arabicPeriod"/>
-            </a:pPr>
-            <a:r>
-              <a:rPr lang="en-US" sz="1800" b="0" i="0" u="none" strike="noStrike" dirty="0">
-                <a:effectLst/>
-              </a:rPr>
-              <a:t>Profile( 1 day)</a:t>
-            </a:r>
-          </a:p>
-          <a:p>
+              <a:t>Routine collection: Create Database collections related to storing routines. Control edit/delete access by user. (1 day)</a:t>
+            </a:r>
             <a:endParaRPr lang="en-US" sz="1800" dirty="0"/>
           </a:p>
         </p:txBody>
@@ -3943,7 +4593,7 @@
     </p:spTree>
     <p:extLst>
       <p:ext uri="{BB962C8B-B14F-4D97-AF65-F5344CB8AC3E}">
-        <p14:creationId xmlns:p14="http://schemas.microsoft.com/office/powerpoint/2010/main" val="181545781"/>
+        <p14:creationId xmlns:p14="http://schemas.microsoft.com/office/powerpoint/2010/main" val="1340545802"/>
       </p:ext>
     </p:extLst>
   </p:cSld>
@@ -3975,235 +4625,6 @@
           <p:cNvPr id="2" name="Title 1">
             <a:extLst>
               <a:ext uri="{FF2B5EF4-FFF2-40B4-BE49-F238E27FC236}">
-                <a16:creationId xmlns:a16="http://schemas.microsoft.com/office/drawing/2014/main" id="{EBACC91F-062D-CF0C-9791-8677B1AC4D2F}"/>
-              </a:ext>
-            </a:extLst>
-          </p:cNvPr>
-          <p:cNvSpPr>
-            <a:spLocks noGrp="1"/>
-          </p:cNvSpPr>
-          <p:nvPr>
-            <p:ph type="title"/>
-          </p:nvPr>
-        </p:nvSpPr>
-        <p:spPr/>
-        <p:txBody>
-          <a:bodyPr/>
-          <a:lstStyle/>
-          <a:p>
-            <a:r>
-              <a:rPr lang="en-US" dirty="0"/>
-              <a:t>Development Timeline</a:t>
-            </a:r>
-          </a:p>
-        </p:txBody>
-      </p:sp>
-      <p:sp>
-        <p:nvSpPr>
-          <p:cNvPr id="3" name="Content Placeholder 2">
-            <a:extLst>
-              <a:ext uri="{FF2B5EF4-FFF2-40B4-BE49-F238E27FC236}">
-                <a16:creationId xmlns:a16="http://schemas.microsoft.com/office/drawing/2014/main" id="{4367105D-6627-EE6C-A923-357747089108}"/>
-              </a:ext>
-            </a:extLst>
-          </p:cNvPr>
-          <p:cNvSpPr>
-            <a:spLocks noGrp="1"/>
-          </p:cNvSpPr>
-          <p:nvPr>
-            <p:ph idx="1"/>
-          </p:nvPr>
-        </p:nvSpPr>
-        <p:spPr/>
-        <p:txBody>
-          <a:bodyPr>
-            <a:noAutofit/>
-          </a:bodyPr>
-          <a:lstStyle/>
-          <a:p>
-            <a:pPr marL="0" indent="0" algn="l">
-              <a:buNone/>
-            </a:pPr>
-            <a:r>
-              <a:rPr lang="en-US" sz="1800" b="1" i="0" u="none" strike="noStrike" dirty="0">
-                <a:effectLst/>
-              </a:rPr>
-              <a:t>Test cases should be created before starting on each component.</a:t>
-            </a:r>
-            <a:endParaRPr lang="en-US" sz="1800" b="0" i="0" u="none" strike="noStrike" dirty="0">
-              <a:effectLst/>
-            </a:endParaRPr>
-          </a:p>
-          <a:p>
-            <a:pPr algn="l">
-              <a:buFont typeface="+mj-lt"/>
-              <a:buAutoNum type="arabicPeriod"/>
-            </a:pPr>
-            <a:r>
-              <a:rPr lang="en-US" sz="1800" b="0" i="0" u="none" strike="noStrike" dirty="0">
-                <a:effectLst/>
-              </a:rPr>
-              <a:t>Fit Test: Create ultra-barebones frontend and database, test CRUD of basic data. (1 day)</a:t>
-            </a:r>
-          </a:p>
-          <a:p>
-            <a:pPr algn="l">
-              <a:buFont typeface="+mj-lt"/>
-              <a:buAutoNum type="arabicPeriod"/>
-            </a:pPr>
-            <a:r>
-              <a:rPr lang="en-US" sz="1800" b="0" i="0" u="none" strike="noStrike" dirty="0">
-                <a:effectLst/>
-              </a:rPr>
-              <a:t>User Collection: Create the collection for user accounts.( 1/2 day)</a:t>
-            </a:r>
-          </a:p>
-          <a:p>
-            <a:pPr algn="l">
-              <a:buFont typeface="+mj-lt"/>
-              <a:buAutoNum type="arabicPeriod"/>
-            </a:pPr>
-            <a:r>
-              <a:rPr lang="en-US" sz="1800" b="0" i="0" u="none" strike="noStrike" dirty="0">
-                <a:effectLst/>
-              </a:rPr>
-              <a:t>User Functions; Create JS functions to handle user data CRUD (2 days)</a:t>
-            </a:r>
-          </a:p>
-          <a:p>
-            <a:pPr algn="l">
-              <a:buFont typeface="+mj-lt"/>
-              <a:buAutoNum type="arabicPeriod"/>
-            </a:pPr>
-            <a:r>
-              <a:rPr lang="en-US" sz="1800" b="0" i="0" u="none" strike="noStrike" dirty="0">
-                <a:effectLst/>
-              </a:rPr>
-              <a:t>User Authorization: Add firebase auth to frontend (1 day)</a:t>
-            </a:r>
-          </a:p>
-          <a:p>
-            <a:pPr algn="l">
-              <a:buFont typeface="+mj-lt"/>
-              <a:buAutoNum type="arabicPeriod"/>
-            </a:pPr>
-            <a:r>
-              <a:rPr lang="en-US" sz="1800" b="0" i="0" u="none" strike="noStrike" dirty="0">
-                <a:effectLst/>
-              </a:rPr>
-              <a:t>Login frontend: Create frontend page to login a user and send them to dummy homepage.(1 day)</a:t>
-            </a:r>
-          </a:p>
-          <a:p>
-            <a:pPr algn="l">
-              <a:buFont typeface="+mj-lt"/>
-              <a:buAutoNum type="arabicPeriod"/>
-            </a:pPr>
-            <a:r>
-              <a:rPr lang="en-US" sz="1800" b="0" i="0" u="none" strike="noStrike" dirty="0">
-                <a:effectLst/>
-              </a:rPr>
-              <a:t>Register frontend: Create registration page to create new users.(1 day)</a:t>
-            </a:r>
-          </a:p>
-          <a:p>
-            <a:pPr algn="l">
-              <a:buFont typeface="+mj-lt"/>
-              <a:buAutoNum type="arabicPeriod"/>
-            </a:pPr>
-            <a:r>
-              <a:rPr lang="en-US" sz="1800" b="0" i="0" u="none" strike="noStrike" dirty="0">
-                <a:effectLst/>
-              </a:rPr>
-              <a:t>Navbar: Create site navigation bar. (1 day)</a:t>
-            </a:r>
-          </a:p>
-          <a:p>
-            <a:pPr algn="l">
-              <a:buFont typeface="+mj-lt"/>
-              <a:buAutoNum type="arabicPeriod"/>
-            </a:pPr>
-            <a:r>
-              <a:rPr lang="en-US" sz="1800" b="0" i="0" u="none" strike="noStrike" dirty="0">
-                <a:effectLst/>
-              </a:rPr>
-              <a:t>Exercise collection: Create collection for </a:t>
-            </a:r>
-            <a:r>
-              <a:rPr lang="en-US" sz="1800" b="0" i="0" u="none" strike="noStrike" dirty="0" err="1">
-                <a:effectLst/>
-              </a:rPr>
-              <a:t>comon</a:t>
-            </a:r>
-            <a:r>
-              <a:rPr lang="en-US" sz="1800" b="0" i="0" u="none" strike="noStrike" dirty="0">
-                <a:effectLst/>
-              </a:rPr>
-              <a:t> exercises, make visible to all users.(1 day)</a:t>
-            </a:r>
-          </a:p>
-          <a:p>
-            <a:pPr algn="l">
-              <a:buFont typeface="+mj-lt"/>
-              <a:buAutoNum type="arabicPeriod"/>
-            </a:pPr>
-            <a:r>
-              <a:rPr lang="en-US" sz="1800" b="0" i="0" u="none" strike="noStrike" dirty="0">
-                <a:effectLst/>
-              </a:rPr>
-              <a:t>Exercise functions: Create JS functions to CRUD exercises. ( 2 days)</a:t>
-            </a:r>
-          </a:p>
-          <a:p>
-            <a:pPr algn="l">
-              <a:buFont typeface="+mj-lt"/>
-              <a:buAutoNum type="arabicPeriod"/>
-            </a:pPr>
-            <a:r>
-              <a:rPr lang="en-US" sz="1800" b="0" i="0" u="none" strike="noStrike" dirty="0">
-                <a:effectLst/>
-              </a:rPr>
-              <a:t>Routine collection: Create Database collections related to storing routines. Control edit/delete access by user. (1 day)</a:t>
-            </a:r>
-            <a:endParaRPr lang="en-US" sz="1800" dirty="0"/>
-          </a:p>
-        </p:txBody>
-      </p:sp>
-    </p:spTree>
-    <p:extLst>
-      <p:ext uri="{BB962C8B-B14F-4D97-AF65-F5344CB8AC3E}">
-        <p14:creationId xmlns:p14="http://schemas.microsoft.com/office/powerpoint/2010/main" val="1340545802"/>
-      </p:ext>
-    </p:extLst>
-  </p:cSld>
-  <p:clrMapOvr>
-    <a:masterClrMapping/>
-  </p:clrMapOvr>
-</p:sld>
-</file>
-
-<file path=ppt/slides/slide6.xml><?xml version="1.0" encoding="utf-8"?>
-<p:sld xmlns:a="http://schemas.openxmlformats.org/drawingml/2006/main" xmlns:r="http://schemas.openxmlformats.org/officeDocument/2006/relationships" xmlns:p="http://schemas.openxmlformats.org/presentationml/2006/main">
-  <p:cSld>
-    <p:spTree>
-      <p:nvGrpSpPr>
-        <p:cNvPr id="1" name=""/>
-        <p:cNvGrpSpPr/>
-        <p:nvPr/>
-      </p:nvGrpSpPr>
-      <p:grpSpPr>
-        <a:xfrm>
-          <a:off x="0" y="0"/>
-          <a:ext cx="0" cy="0"/>
-          <a:chOff x="0" y="0"/>
-          <a:chExt cx="0" cy="0"/>
-        </a:xfrm>
-      </p:grpSpPr>
-      <p:sp>
-        <p:nvSpPr>
-          <p:cNvPr id="2" name="Title 1">
-            <a:extLst>
-              <a:ext uri="{FF2B5EF4-FFF2-40B4-BE49-F238E27FC236}">
                 <a16:creationId xmlns:a16="http://schemas.microsoft.com/office/drawing/2014/main" id="{35F4DE91-1B91-61B8-2BF9-FAD89ADAEA29}"/>
               </a:ext>
             </a:extLst>
@@ -4482,7 +4903,7 @@
 </p:sld>
 </file>
 
-<file path=ppt/slides/slide7.xml><?xml version="1.0" encoding="utf-8"?>
+<file path=ppt/slides/slide6.xml><?xml version="1.0" encoding="utf-8"?>
 <p:sld xmlns:a="http://schemas.openxmlformats.org/drawingml/2006/main" xmlns:r="http://schemas.openxmlformats.org/officeDocument/2006/relationships" xmlns:p="http://schemas.openxmlformats.org/presentationml/2006/main">
   <p:cSld>
     <p:spTree>
@@ -4574,6 +4995,166 @@
 </p:sld>
 </file>
 
+<file path=ppt/slides/slide7.xml><?xml version="1.0" encoding="utf-8"?>
+<p:sld xmlns:a="http://schemas.openxmlformats.org/drawingml/2006/main" xmlns:r="http://schemas.openxmlformats.org/officeDocument/2006/relationships" xmlns:p="http://schemas.openxmlformats.org/presentationml/2006/main">
+  <p:cSld>
+    <p:spTree>
+      <p:nvGrpSpPr>
+        <p:cNvPr id="1" name=""/>
+        <p:cNvGrpSpPr/>
+        <p:nvPr/>
+      </p:nvGrpSpPr>
+      <p:grpSpPr>
+        <a:xfrm>
+          <a:off x="0" y="0"/>
+          <a:ext cx="0" cy="0"/>
+          <a:chOff x="0" y="0"/>
+          <a:chExt cx="0" cy="0"/>
+        </a:xfrm>
+      </p:grpSpPr>
+      <p:sp>
+        <p:nvSpPr>
+          <p:cNvPr id="2" name="Title 1">
+            <a:extLst>
+              <a:ext uri="{FF2B5EF4-FFF2-40B4-BE49-F238E27FC236}">
+                <a16:creationId xmlns:a16="http://schemas.microsoft.com/office/drawing/2014/main" id="{E7EBA379-5B67-D0AA-BD2F-EBC46E345887}"/>
+              </a:ext>
+            </a:extLst>
+          </p:cNvPr>
+          <p:cNvSpPr>
+            <a:spLocks noGrp="1"/>
+          </p:cNvSpPr>
+          <p:nvPr>
+            <p:ph type="title"/>
+          </p:nvPr>
+        </p:nvSpPr>
+        <p:spPr/>
+        <p:txBody>
+          <a:bodyPr/>
+          <a:lstStyle/>
+          <a:p>
+            <a:r>
+              <a:rPr lang="en-US" dirty="0"/>
+              <a:t>Updated Tech Stack</a:t>
+            </a:r>
+          </a:p>
+        </p:txBody>
+      </p:sp>
+      <p:sp>
+        <p:nvSpPr>
+          <p:cNvPr id="3" name="Content Placeholder 2">
+            <a:extLst>
+              <a:ext uri="{FF2B5EF4-FFF2-40B4-BE49-F238E27FC236}">
+                <a16:creationId xmlns:a16="http://schemas.microsoft.com/office/drawing/2014/main" id="{C0CD66DF-2809-0C0A-46C2-E907A03D9109}"/>
+              </a:ext>
+            </a:extLst>
+          </p:cNvPr>
+          <p:cNvSpPr>
+            <a:spLocks noGrp="1"/>
+          </p:cNvSpPr>
+          <p:nvPr>
+            <p:ph idx="1"/>
+          </p:nvPr>
+        </p:nvSpPr>
+        <p:spPr/>
+        <p:txBody>
+          <a:bodyPr/>
+          <a:lstStyle/>
+          <a:p>
+            <a:pPr>
+              <a:buFontTx/>
+              <a:buChar char="-"/>
+            </a:pPr>
+            <a:r>
+              <a:rPr lang="en-US" dirty="0" err="1"/>
+              <a:t>Nuxt.js</a:t>
+            </a:r>
+            <a:r>
+              <a:rPr lang="en-US" dirty="0"/>
+              <a:t>/Vue frontend</a:t>
+            </a:r>
+          </a:p>
+          <a:p>
+            <a:pPr>
+              <a:buFontTx/>
+              <a:buChar char="-"/>
+            </a:pPr>
+            <a:r>
+              <a:rPr lang="en-US" dirty="0" err="1"/>
+              <a:t>Algolia</a:t>
+            </a:r>
+            <a:r>
+              <a:rPr lang="en-US" dirty="0"/>
+              <a:t> (Search)</a:t>
+            </a:r>
+          </a:p>
+          <a:p>
+            <a:pPr>
+              <a:buFontTx/>
+              <a:buChar char="-"/>
+            </a:pPr>
+            <a:r>
+              <a:rPr lang="en-US" dirty="0" err="1"/>
+              <a:t>Firestore</a:t>
+            </a:r>
+            <a:r>
+              <a:rPr lang="en-US" dirty="0"/>
+              <a:t> (Database)</a:t>
+            </a:r>
+          </a:p>
+          <a:p>
+            <a:pPr>
+              <a:buFontTx/>
+              <a:buChar char="-"/>
+            </a:pPr>
+            <a:r>
+              <a:rPr lang="en-US" dirty="0"/>
+              <a:t>Firebase Auth (Auth)</a:t>
+            </a:r>
+          </a:p>
+          <a:p>
+            <a:pPr>
+              <a:buFontTx/>
+              <a:buChar char="-"/>
+            </a:pPr>
+            <a:r>
+              <a:rPr lang="en-US" dirty="0" err="1"/>
+              <a:t>neovim</a:t>
+            </a:r>
+            <a:r>
+              <a:rPr lang="en-US" dirty="0"/>
+              <a:t> (text editor)</a:t>
+            </a:r>
+          </a:p>
+          <a:p>
+            <a:pPr>
+              <a:buFontTx/>
+              <a:buChar char="-"/>
+            </a:pPr>
+            <a:r>
+              <a:rPr lang="en-US" dirty="0" err="1"/>
+              <a:t>TailwindCSS</a:t>
+            </a:r>
+            <a:r>
+              <a:rPr lang="en-US" dirty="0"/>
+              <a:t> (CSS classes)</a:t>
+            </a:r>
+          </a:p>
+        </p:txBody>
+      </p:sp>
+    </p:spTree>
+    <p:extLst>
+      <p:ext uri="{BB962C8B-B14F-4D97-AF65-F5344CB8AC3E}">
+        <p14:creationId xmlns:p14="http://schemas.microsoft.com/office/powerpoint/2010/main" val="757098956"/>
+      </p:ext>
+    </p:extLst>
+  </p:cSld>
+  <p:clrMapOvr>
+    <a:masterClrMapping/>
+  </p:clrMapOvr>
+</p:sld>
+</file>
+
 <file path=ppt/slides/slide8.xml><?xml version="1.0" encoding="utf-8"?>
 <p:sld xmlns:a="http://schemas.openxmlformats.org/drawingml/2006/main" xmlns:r="http://schemas.openxmlformats.org/officeDocument/2006/relationships" xmlns:p="http://schemas.openxmlformats.org/presentationml/2006/main">
   <p:cSld>
@@ -4596,7 +5177,7 @@
           <p:cNvPr id="2" name="Title 1">
             <a:extLst>
               <a:ext uri="{FF2B5EF4-FFF2-40B4-BE49-F238E27FC236}">
-                <a16:creationId xmlns:a16="http://schemas.microsoft.com/office/drawing/2014/main" id="{E7EBA379-5B67-D0AA-BD2F-EBC46E345887}"/>
+                <a16:creationId xmlns:a16="http://schemas.microsoft.com/office/drawing/2014/main" id="{D2DB3EAF-DAA3-A378-EF54-E1D844942DC2}"/>
               </a:ext>
             </a:extLst>
           </p:cNvPr>
@@ -4614,7 +5195,7 @@
           <a:p>
             <a:r>
               <a:rPr lang="en-US" dirty="0"/>
-              <a:t>Updated Tech Stack</a:t>
+              <a:t>Other Notes</a:t>
             </a:r>
           </a:p>
         </p:txBody>
@@ -4624,7 +5205,7 @@
           <p:cNvPr id="3" name="Content Placeholder 2">
             <a:extLst>
               <a:ext uri="{FF2B5EF4-FFF2-40B4-BE49-F238E27FC236}">
-                <a16:creationId xmlns:a16="http://schemas.microsoft.com/office/drawing/2014/main" id="{C0CD66DF-2809-0C0A-46C2-E907A03D9109}"/>
+                <a16:creationId xmlns:a16="http://schemas.microsoft.com/office/drawing/2014/main" id="{2DA5D62F-6262-DE29-34BC-815ECE17A96D}"/>
               </a:ext>
             </a:extLst>
           </p:cNvPr>
@@ -4640,83 +5221,12 @@
           <a:bodyPr/>
           <a:lstStyle/>
           <a:p>
-            <a:pPr>
-              <a:buFontTx/>
-              <a:buChar char="-"/>
+            <a:pPr marL="0" indent="0">
+              <a:buNone/>
             </a:pPr>
             <a:r>
-              <a:rPr lang="en-US" dirty="0" err="1"/>
-              <a:t>Nuxt.js</a:t>
-            </a:r>
-            <a:r>
               <a:rPr lang="en-US" dirty="0"/>
-              <a:t>/Vue frontend</a:t>
-            </a:r>
-          </a:p>
-          <a:p>
-            <a:pPr>
-              <a:buFontTx/>
-              <a:buChar char="-"/>
-            </a:pPr>
-            <a:r>
-              <a:rPr lang="en-US" dirty="0" err="1"/>
-              <a:t>Algolia</a:t>
-            </a:r>
-            <a:r>
-              <a:rPr lang="en-US" dirty="0"/>
-              <a:t> (Search)</a:t>
-            </a:r>
-          </a:p>
-          <a:p>
-            <a:pPr>
-              <a:buFontTx/>
-              <a:buChar char="-"/>
-            </a:pPr>
-            <a:r>
-              <a:rPr lang="en-US" dirty="0" err="1"/>
-              <a:t>Firestore</a:t>
-            </a:r>
-            <a:r>
-              <a:rPr lang="en-US" dirty="0"/>
-              <a:t> (Database)</a:t>
-            </a:r>
-          </a:p>
-          <a:p>
-            <a:pPr>
-              <a:buFontTx/>
-              <a:buChar char="-"/>
-            </a:pPr>
-            <a:r>
-              <a:rPr lang="en-US" dirty="0"/>
-              <a:t>Firebase Auth (Auth)</a:t>
-            </a:r>
-          </a:p>
-          <a:p>
-            <a:pPr>
-              <a:buFontTx/>
-              <a:buChar char="-"/>
-            </a:pPr>
-            <a:r>
-              <a:rPr lang="en-US" dirty="0" err="1"/>
-              <a:t>nvim</a:t>
-            </a:r>
-            <a:r>
-              <a:rPr lang="en-US" dirty="0"/>
-              <a:t> (text editor)</a:t>
-            </a:r>
-          </a:p>
-          <a:p>
-            <a:pPr>
-              <a:buFontTx/>
-              <a:buChar char="-"/>
-            </a:pPr>
-            <a:r>
-              <a:rPr lang="en-US" dirty="0" err="1"/>
-              <a:t>TailwindCSS</a:t>
-            </a:r>
-            <a:r>
-              <a:rPr lang="en-US" dirty="0"/>
-              <a:t> (CSS classes)</a:t>
+              <a:t>- I dropped the System Sequence Diagram because given the amount of time I have, the user flow diagram does enough of the same things for me.</a:t>
             </a:r>
           </a:p>
         </p:txBody>
@@ -4724,7 +5234,7 @@
     </p:spTree>
     <p:extLst>
       <p:ext uri="{BB962C8B-B14F-4D97-AF65-F5344CB8AC3E}">
-        <p14:creationId xmlns:p14="http://schemas.microsoft.com/office/powerpoint/2010/main" val="757098956"/>
+        <p14:creationId xmlns:p14="http://schemas.microsoft.com/office/powerpoint/2010/main" val="3129820154"/>
       </p:ext>
     </p:extLst>
   </p:cSld>
@@ -5117,4 +5627,299 @@
     </a:ext>
   </a:extLst>
 </a:theme>
+</file>
+
+<file path=ppt/theme/theme2.xml><?xml version="1.0" encoding="utf-8"?>
+<a:theme xmlns:a="http://schemas.openxmlformats.org/drawingml/2006/main" name="Office Theme">
+  <a:themeElements>
+    <a:clrScheme name="Office">
+      <a:dk1>
+        <a:sysClr val="windowText" lastClr="000000"/>
+      </a:dk1>
+      <a:lt1>
+        <a:sysClr val="window" lastClr="FFFFFF"/>
+      </a:lt1>
+      <a:dk2>
+        <a:srgbClr val="44546A"/>
+      </a:dk2>
+      <a:lt2>
+        <a:srgbClr val="E7E6E6"/>
+      </a:lt2>
+      <a:accent1>
+        <a:srgbClr val="4472C4"/>
+      </a:accent1>
+      <a:accent2>
+        <a:srgbClr val="ED7D31"/>
+      </a:accent2>
+      <a:accent3>
+        <a:srgbClr val="A5A5A5"/>
+      </a:accent3>
+      <a:accent4>
+        <a:srgbClr val="FFC000"/>
+      </a:accent4>
+      <a:accent5>
+        <a:srgbClr val="5B9BD5"/>
+      </a:accent5>
+      <a:accent6>
+        <a:srgbClr val="70AD47"/>
+      </a:accent6>
+      <a:hlink>
+        <a:srgbClr val="0563C1"/>
+      </a:hlink>
+      <a:folHlink>
+        <a:srgbClr val="954F72"/>
+      </a:folHlink>
+    </a:clrScheme>
+    <a:fontScheme name="Office">
+      <a:majorFont>
+        <a:latin typeface="Calibri Light" panose="020F0302020204030204"/>
+        <a:ea typeface=""/>
+        <a:cs typeface=""/>
+        <a:font script="Jpan" typeface="游ゴシック Light"/>
+        <a:font script="Hang" typeface="맑은 고딕"/>
+        <a:font script="Hans" typeface="等线 Light"/>
+        <a:font script="Hant" typeface="新細明體"/>
+        <a:font script="Arab" typeface="Times New Roman"/>
+        <a:font script="Hebr" typeface="Times New Roman"/>
+        <a:font script="Thai" typeface="Angsana New"/>
+        <a:font script="Ethi" typeface="Nyala"/>
+        <a:font script="Beng" typeface="Vrinda"/>
+        <a:font script="Gujr" typeface="Shruti"/>
+        <a:font script="Khmr" typeface="MoolBoran"/>
+        <a:font script="Knda" typeface="Tunga"/>
+        <a:font script="Guru" typeface="Raavi"/>
+        <a:font script="Cans" typeface="Euphemia"/>
+        <a:font script="Cher" typeface="Plantagenet Cherokee"/>
+        <a:font script="Yiii" typeface="Microsoft Yi Baiti"/>
+        <a:font script="Tibt" typeface="Microsoft Himalaya"/>
+        <a:font script="Thaa" typeface="MV Boli"/>
+        <a:font script="Deva" typeface="Mangal"/>
+        <a:font script="Telu" typeface="Gautami"/>
+        <a:font script="Taml" typeface="Latha"/>
+        <a:font script="Syrc" typeface="Estrangelo Edessa"/>
+        <a:font script="Orya" typeface="Kalinga"/>
+        <a:font script="Mlym" typeface="Kartika"/>
+        <a:font script="Laoo" typeface="DokChampa"/>
+        <a:font script="Sinh" typeface="Iskoola Pota"/>
+        <a:font script="Mong" typeface="Mongolian Baiti"/>
+        <a:font script="Viet" typeface="Times New Roman"/>
+        <a:font script="Uigh" typeface="Microsoft Uighur"/>
+        <a:font script="Geor" typeface="Sylfaen"/>
+        <a:font script="Armn" typeface="Arial"/>
+        <a:font script="Bugi" typeface="Leelawadee UI"/>
+        <a:font script="Bopo" typeface="Microsoft JhengHei"/>
+        <a:font script="Java" typeface="Javanese Text"/>
+        <a:font script="Lisu" typeface="Segoe UI"/>
+        <a:font script="Mymr" typeface="Myanmar Text"/>
+        <a:font script="Nkoo" typeface="Ebrima"/>
+        <a:font script="Olck" typeface="Nirmala UI"/>
+        <a:font script="Osma" typeface="Ebrima"/>
+        <a:font script="Phag" typeface="Phagspa"/>
+        <a:font script="Syrn" typeface="Estrangelo Edessa"/>
+        <a:font script="Syrj" typeface="Estrangelo Edessa"/>
+        <a:font script="Syre" typeface="Estrangelo Edessa"/>
+        <a:font script="Sora" typeface="Nirmala UI"/>
+        <a:font script="Tale" typeface="Microsoft Tai Le"/>
+        <a:font script="Talu" typeface="Microsoft New Tai Lue"/>
+        <a:font script="Tfng" typeface="Ebrima"/>
+      </a:majorFont>
+      <a:minorFont>
+        <a:latin typeface="Calibri" panose="020F0502020204030204"/>
+        <a:ea typeface=""/>
+        <a:cs typeface=""/>
+        <a:font script="Jpan" typeface="游ゴシック"/>
+        <a:font script="Hang" typeface="맑은 고딕"/>
+        <a:font script="Hans" typeface="等线"/>
+        <a:font script="Hant" typeface="新細明體"/>
+        <a:font script="Arab" typeface="Arial"/>
+        <a:font script="Hebr" typeface="Arial"/>
+        <a:font script="Thai" typeface="Cordia New"/>
+        <a:font script="Ethi" typeface="Nyala"/>
+        <a:font script="Beng" typeface="Vrinda"/>
+        <a:font script="Gujr" typeface="Shruti"/>
+        <a:font script="Khmr" typeface="DaunPenh"/>
+        <a:font script="Knda" typeface="Tunga"/>
+        <a:font script="Guru" typeface="Raavi"/>
+        <a:font script="Cans" typeface="Euphemia"/>
+        <a:font script="Cher" typeface="Plantagenet Cherokee"/>
+        <a:font script="Yiii" typeface="Microsoft Yi Baiti"/>
+        <a:font script="Tibt" typeface="Microsoft Himalaya"/>
+        <a:font script="Thaa" typeface="MV Boli"/>
+        <a:font script="Deva" typeface="Mangal"/>
+        <a:font script="Telu" typeface="Gautami"/>
+        <a:font script="Taml" typeface="Latha"/>
+        <a:font script="Syrc" typeface="Estrangelo Edessa"/>
+        <a:font script="Orya" typeface="Kalinga"/>
+        <a:font script="Mlym" typeface="Kartika"/>
+        <a:font script="Laoo" typeface="DokChampa"/>
+        <a:font script="Sinh" typeface="Iskoola Pota"/>
+        <a:font script="Mong" typeface="Mongolian Baiti"/>
+        <a:font script="Viet" typeface="Arial"/>
+        <a:font script="Uigh" typeface="Microsoft Uighur"/>
+        <a:font script="Geor" typeface="Sylfaen"/>
+        <a:font script="Armn" typeface="Arial"/>
+        <a:font script="Bugi" typeface="Leelawadee UI"/>
+        <a:font script="Bopo" typeface="Microsoft JhengHei"/>
+        <a:font script="Java" typeface="Javanese Text"/>
+        <a:font script="Lisu" typeface="Segoe UI"/>
+        <a:font script="Mymr" typeface="Myanmar Text"/>
+        <a:font script="Nkoo" typeface="Ebrima"/>
+        <a:font script="Olck" typeface="Nirmala UI"/>
+        <a:font script="Osma" typeface="Ebrima"/>
+        <a:font script="Phag" typeface="Phagspa"/>
+        <a:font script="Syrn" typeface="Estrangelo Edessa"/>
+        <a:font script="Syrj" typeface="Estrangelo Edessa"/>
+        <a:font script="Syre" typeface="Estrangelo Edessa"/>
+        <a:font script="Sora" typeface="Nirmala UI"/>
+        <a:font script="Tale" typeface="Microsoft Tai Le"/>
+        <a:font script="Talu" typeface="Microsoft New Tai Lue"/>
+        <a:font script="Tfng" typeface="Ebrima"/>
+      </a:minorFont>
+    </a:fontScheme>
+    <a:fmtScheme name="Office">
+      <a:fillStyleLst>
+        <a:solidFill>
+          <a:schemeClr val="phClr"/>
+        </a:solidFill>
+        <a:gradFill rotWithShape="1">
+          <a:gsLst>
+            <a:gs pos="0">
+              <a:schemeClr val="phClr">
+                <a:lumMod val="110000"/>
+                <a:satMod val="105000"/>
+                <a:tint val="67000"/>
+              </a:schemeClr>
+            </a:gs>
+            <a:gs pos="50000">
+              <a:schemeClr val="phClr">
+                <a:lumMod val="105000"/>
+                <a:satMod val="103000"/>
+                <a:tint val="73000"/>
+              </a:schemeClr>
+            </a:gs>
+            <a:gs pos="100000">
+              <a:schemeClr val="phClr">
+                <a:lumMod val="105000"/>
+                <a:satMod val="109000"/>
+                <a:tint val="81000"/>
+              </a:schemeClr>
+            </a:gs>
+          </a:gsLst>
+          <a:lin ang="5400000" scaled="0"/>
+        </a:gradFill>
+        <a:gradFill rotWithShape="1">
+          <a:gsLst>
+            <a:gs pos="0">
+              <a:schemeClr val="phClr">
+                <a:satMod val="103000"/>
+                <a:lumMod val="102000"/>
+                <a:tint val="94000"/>
+              </a:schemeClr>
+            </a:gs>
+            <a:gs pos="50000">
+              <a:schemeClr val="phClr">
+                <a:satMod val="110000"/>
+                <a:lumMod val="100000"/>
+                <a:shade val="100000"/>
+              </a:schemeClr>
+            </a:gs>
+            <a:gs pos="100000">
+              <a:schemeClr val="phClr">
+                <a:lumMod val="99000"/>
+                <a:satMod val="120000"/>
+                <a:shade val="78000"/>
+              </a:schemeClr>
+            </a:gs>
+          </a:gsLst>
+          <a:lin ang="5400000" scaled="0"/>
+        </a:gradFill>
+      </a:fillStyleLst>
+      <a:lnStyleLst>
+        <a:ln w="6350" cap="flat" cmpd="sng" algn="ctr">
+          <a:solidFill>
+            <a:schemeClr val="phClr"/>
+          </a:solidFill>
+          <a:prstDash val="solid"/>
+          <a:miter lim="800000"/>
+        </a:ln>
+        <a:ln w="12700" cap="flat" cmpd="sng" algn="ctr">
+          <a:solidFill>
+            <a:schemeClr val="phClr"/>
+          </a:solidFill>
+          <a:prstDash val="solid"/>
+          <a:miter lim="800000"/>
+        </a:ln>
+        <a:ln w="19050" cap="flat" cmpd="sng" algn="ctr">
+          <a:solidFill>
+            <a:schemeClr val="phClr"/>
+          </a:solidFill>
+          <a:prstDash val="solid"/>
+          <a:miter lim="800000"/>
+        </a:ln>
+      </a:lnStyleLst>
+      <a:effectStyleLst>
+        <a:effectStyle>
+          <a:effectLst/>
+        </a:effectStyle>
+        <a:effectStyle>
+          <a:effectLst/>
+        </a:effectStyle>
+        <a:effectStyle>
+          <a:effectLst>
+            <a:outerShdw blurRad="57150" dist="19050" dir="5400000" algn="ctr" rotWithShape="0">
+              <a:srgbClr val="000000">
+                <a:alpha val="63000"/>
+              </a:srgbClr>
+            </a:outerShdw>
+          </a:effectLst>
+        </a:effectStyle>
+      </a:effectStyleLst>
+      <a:bgFillStyleLst>
+        <a:solidFill>
+          <a:schemeClr val="phClr"/>
+        </a:solidFill>
+        <a:solidFill>
+          <a:schemeClr val="phClr">
+            <a:tint val="95000"/>
+            <a:satMod val="170000"/>
+          </a:schemeClr>
+        </a:solidFill>
+        <a:gradFill rotWithShape="1">
+          <a:gsLst>
+            <a:gs pos="0">
+              <a:schemeClr val="phClr">
+                <a:tint val="93000"/>
+                <a:satMod val="150000"/>
+                <a:shade val="98000"/>
+                <a:lumMod val="102000"/>
+              </a:schemeClr>
+            </a:gs>
+            <a:gs pos="50000">
+              <a:schemeClr val="phClr">
+                <a:tint val="98000"/>
+                <a:satMod val="130000"/>
+                <a:shade val="90000"/>
+                <a:lumMod val="103000"/>
+              </a:schemeClr>
+            </a:gs>
+            <a:gs pos="100000">
+              <a:schemeClr val="phClr">
+                <a:shade val="63000"/>
+                <a:satMod val="120000"/>
+              </a:schemeClr>
+            </a:gs>
+          </a:gsLst>
+          <a:lin ang="5400000" scaled="0"/>
+        </a:gradFill>
+      </a:bgFillStyleLst>
+    </a:fmtScheme>
+  </a:themeElements>
+  <a:objectDefaults/>
+  <a:extraClrSchemeLst/>
+  <a:extLst>
+    <a:ext uri="{05A4C25C-085E-4340-85A3-A5531E510DB2}">
+      <thm15:themeFamily xmlns:thm15="http://schemas.microsoft.com/office/thememl/2012/main" name="Office Theme" id="{62F939B6-93AF-4DB8-9C6B-D6C7DFDC589F}" vid="{4A3C46E8-61CC-4603-A589-7422A47A8E4A}"/>
+    </a:ext>
+  </a:extLst>
+</a:theme>
 </file>
</xml_diff>